<commit_message>
update packet tracer files
</commit_message>
<xml_diff>
--- a/ppt/ArchitetturaOracoloRingClient.pptx
+++ b/ppt/ArchitetturaOracoloRingClient.pptx
@@ -7,6 +7,8 @@
   <p:sldIdLst>
     <p:sldId id="256" r:id="rId2"/>
     <p:sldId id="257" r:id="rId3"/>
+    <p:sldId id="258" r:id="rId4"/>
+    <p:sldId id="259" r:id="rId5"/>
   </p:sldIdLst>
   <p:sldSz cx="12192000" cy="6858000"/>
   <p:notesSz cx="6858000" cy="9144000"/>
@@ -273,7 +275,7 @@
           <a:p>
             <a:fld id="{5B854596-3BF0-4EE8-9E50-2841E8B47628}" type="datetimeFigureOut">
               <a:rPr lang="en-GB" smtClean="0"/>
-              <a:t>16/04/2021</a:t>
+              <a:t>19/04/2021</a:t>
             </a:fld>
             <a:endParaRPr lang="en-GB"/>
           </a:p>
@@ -473,7 +475,7 @@
           <a:p>
             <a:fld id="{5B854596-3BF0-4EE8-9E50-2841E8B47628}" type="datetimeFigureOut">
               <a:rPr lang="en-GB" smtClean="0"/>
-              <a:t>16/04/2021</a:t>
+              <a:t>19/04/2021</a:t>
             </a:fld>
             <a:endParaRPr lang="en-GB"/>
           </a:p>
@@ -683,7 +685,7 @@
           <a:p>
             <a:fld id="{5B854596-3BF0-4EE8-9E50-2841E8B47628}" type="datetimeFigureOut">
               <a:rPr lang="en-GB" smtClean="0"/>
-              <a:t>16/04/2021</a:t>
+              <a:t>19/04/2021</a:t>
             </a:fld>
             <a:endParaRPr lang="en-GB"/>
           </a:p>
@@ -883,7 +885,7 @@
           <a:p>
             <a:fld id="{5B854596-3BF0-4EE8-9E50-2841E8B47628}" type="datetimeFigureOut">
               <a:rPr lang="en-GB" smtClean="0"/>
-              <a:t>16/04/2021</a:t>
+              <a:t>19/04/2021</a:t>
             </a:fld>
             <a:endParaRPr lang="en-GB"/>
           </a:p>
@@ -1159,7 +1161,7 @@
           <a:p>
             <a:fld id="{5B854596-3BF0-4EE8-9E50-2841E8B47628}" type="datetimeFigureOut">
               <a:rPr lang="en-GB" smtClean="0"/>
-              <a:t>16/04/2021</a:t>
+              <a:t>19/04/2021</a:t>
             </a:fld>
             <a:endParaRPr lang="en-GB"/>
           </a:p>
@@ -1427,7 +1429,7 @@
           <a:p>
             <a:fld id="{5B854596-3BF0-4EE8-9E50-2841E8B47628}" type="datetimeFigureOut">
               <a:rPr lang="en-GB" smtClean="0"/>
-              <a:t>16/04/2021</a:t>
+              <a:t>19/04/2021</a:t>
             </a:fld>
             <a:endParaRPr lang="en-GB"/>
           </a:p>
@@ -1842,7 +1844,7 @@
           <a:p>
             <a:fld id="{5B854596-3BF0-4EE8-9E50-2841E8B47628}" type="datetimeFigureOut">
               <a:rPr lang="en-GB" smtClean="0"/>
-              <a:t>16/04/2021</a:t>
+              <a:t>19/04/2021</a:t>
             </a:fld>
             <a:endParaRPr lang="en-GB"/>
           </a:p>
@@ -1984,7 +1986,7 @@
           <a:p>
             <a:fld id="{5B854596-3BF0-4EE8-9E50-2841E8B47628}" type="datetimeFigureOut">
               <a:rPr lang="en-GB" smtClean="0"/>
-              <a:t>16/04/2021</a:t>
+              <a:t>19/04/2021</a:t>
             </a:fld>
             <a:endParaRPr lang="en-GB"/>
           </a:p>
@@ -2097,7 +2099,7 @@
           <a:p>
             <a:fld id="{5B854596-3BF0-4EE8-9E50-2841E8B47628}" type="datetimeFigureOut">
               <a:rPr lang="en-GB" smtClean="0"/>
-              <a:t>16/04/2021</a:t>
+              <a:t>19/04/2021</a:t>
             </a:fld>
             <a:endParaRPr lang="en-GB"/>
           </a:p>
@@ -2410,7 +2412,7 @@
           <a:p>
             <a:fld id="{5B854596-3BF0-4EE8-9E50-2841E8B47628}" type="datetimeFigureOut">
               <a:rPr lang="en-GB" smtClean="0"/>
-              <a:t>16/04/2021</a:t>
+              <a:t>19/04/2021</a:t>
             </a:fld>
             <a:endParaRPr lang="en-GB"/>
           </a:p>
@@ -2699,7 +2701,7 @@
           <a:p>
             <a:fld id="{5B854596-3BF0-4EE8-9E50-2841E8B47628}" type="datetimeFigureOut">
               <a:rPr lang="en-GB" smtClean="0"/>
-              <a:t>16/04/2021</a:t>
+              <a:t>19/04/2021</a:t>
             </a:fld>
             <a:endParaRPr lang="en-GB"/>
           </a:p>
@@ -2942,7 +2944,7 @@
           <a:p>
             <a:fld id="{5B854596-3BF0-4EE8-9E50-2841E8B47628}" type="datetimeFigureOut">
               <a:rPr lang="en-GB" smtClean="0"/>
-              <a:t>16/04/2021</a:t>
+              <a:t>19/04/2021</a:t>
             </a:fld>
             <a:endParaRPr lang="en-GB"/>
           </a:p>
@@ -5415,6 +5417,2911 @@
 </p:sld>
 </file>
 
+<file path=ppt/slides/slide3.xml><?xml version="1.0" encoding="utf-8"?>
+<p:sld xmlns:a="http://schemas.openxmlformats.org/drawingml/2006/main" xmlns:r="http://schemas.openxmlformats.org/officeDocument/2006/relationships" xmlns:p="http://schemas.openxmlformats.org/presentationml/2006/main">
+  <p:cSld>
+    <p:spTree>
+      <p:nvGrpSpPr>
+        <p:cNvPr id="1" name=""/>
+        <p:cNvGrpSpPr/>
+        <p:nvPr/>
+      </p:nvGrpSpPr>
+      <p:grpSpPr>
+        <a:xfrm>
+          <a:off x="0" y="0"/>
+          <a:ext cx="0" cy="0"/>
+          <a:chOff x="0" y="0"/>
+          <a:chExt cx="0" cy="0"/>
+        </a:xfrm>
+      </p:grpSpPr>
+      <p:sp>
+        <p:nvSpPr>
+          <p:cNvPr id="2" name="Rettangolo 1">
+            <a:extLst>
+              <a:ext uri="{FF2B5EF4-FFF2-40B4-BE49-F238E27FC236}">
+                <a16:creationId xmlns:a16="http://schemas.microsoft.com/office/drawing/2014/main" id="{A66E43D5-57D6-442B-A91C-8233EDDCC4D0}"/>
+              </a:ext>
+            </a:extLst>
+          </p:cNvPr>
+          <p:cNvSpPr/>
+          <p:nvPr/>
+        </p:nvSpPr>
+        <p:spPr>
+          <a:xfrm>
+            <a:off x="1054963" y="545611"/>
+            <a:ext cx="1593908" cy="713064"/>
+          </a:xfrm>
+          <a:prstGeom prst="rect">
+            <a:avLst/>
+          </a:prstGeom>
+        </p:spPr>
+        <p:style>
+          <a:lnRef idx="2">
+            <a:schemeClr val="accent1">
+              <a:shade val="50000"/>
+            </a:schemeClr>
+          </a:lnRef>
+          <a:fillRef idx="1">
+            <a:schemeClr val="accent1"/>
+          </a:fillRef>
+          <a:effectRef idx="0">
+            <a:schemeClr val="accent1"/>
+          </a:effectRef>
+          <a:fontRef idx="minor">
+            <a:schemeClr val="lt1"/>
+          </a:fontRef>
+        </p:style>
+        <p:txBody>
+          <a:bodyPr rtlCol="0" anchor="ctr"/>
+          <a:lstStyle/>
+          <a:p>
+            <a:pPr algn="ctr"/>
+            <a:r>
+              <a:rPr lang="it-IT" dirty="0"/>
+              <a:t>Nodo</a:t>
+            </a:r>
+            <a:endParaRPr lang="en-GB" dirty="0"/>
+          </a:p>
+        </p:txBody>
+      </p:sp>
+      <p:grpSp>
+        <p:nvGrpSpPr>
+          <p:cNvPr id="10" name="Gruppo 9">
+            <a:extLst>
+              <a:ext uri="{FF2B5EF4-FFF2-40B4-BE49-F238E27FC236}">
+                <a16:creationId xmlns:a16="http://schemas.microsoft.com/office/drawing/2014/main" id="{B11B0482-7FA1-41E4-9D20-35D3B32BB61F}"/>
+              </a:ext>
+            </a:extLst>
+          </p:cNvPr>
+          <p:cNvGrpSpPr/>
+          <p:nvPr/>
+        </p:nvGrpSpPr>
+        <p:grpSpPr>
+          <a:xfrm>
+            <a:off x="12343935" y="118891"/>
+            <a:ext cx="4781724" cy="2133413"/>
+            <a:chOff x="1432095" y="2008651"/>
+            <a:chExt cx="4781724" cy="2133413"/>
+          </a:xfrm>
+        </p:grpSpPr>
+        <p:sp>
+          <p:nvSpPr>
+            <p:cNvPr id="3" name="Rettangolo 2">
+              <a:extLst>
+                <a:ext uri="{FF2B5EF4-FFF2-40B4-BE49-F238E27FC236}">
+                  <a16:creationId xmlns:a16="http://schemas.microsoft.com/office/drawing/2014/main" id="{EF729AD3-09A2-4CFE-9E17-E5939202E9AB}"/>
+                </a:ext>
+              </a:extLst>
+            </p:cNvPr>
+            <p:cNvSpPr/>
+            <p:nvPr/>
+          </p:nvSpPr>
+          <p:spPr>
+            <a:xfrm>
+              <a:off x="3026003" y="2008651"/>
+              <a:ext cx="1593908" cy="713064"/>
+            </a:xfrm>
+            <a:prstGeom prst="rect">
+              <a:avLst/>
+            </a:prstGeom>
+          </p:spPr>
+          <p:style>
+            <a:lnRef idx="2">
+              <a:schemeClr val="accent1">
+                <a:shade val="50000"/>
+              </a:schemeClr>
+            </a:lnRef>
+            <a:fillRef idx="1">
+              <a:schemeClr val="accent1"/>
+            </a:fillRef>
+            <a:effectRef idx="0">
+              <a:schemeClr val="accent1"/>
+            </a:effectRef>
+            <a:fontRef idx="minor">
+              <a:schemeClr val="lt1"/>
+            </a:fontRef>
+          </p:style>
+          <p:txBody>
+            <a:bodyPr rtlCol="0" anchor="ctr"/>
+            <a:lstStyle/>
+            <a:p>
+              <a:pPr algn="ctr"/>
+              <a:r>
+                <a:rPr lang="it-IT" dirty="0" err="1"/>
+                <a:t>Conf</a:t>
+              </a:r>
+              <a:r>
+                <a:rPr lang="it-IT" dirty="0"/>
+                <a:t> &amp; Join</a:t>
+              </a:r>
+              <a:endParaRPr lang="en-GB" dirty="0"/>
+            </a:p>
+          </p:txBody>
+        </p:sp>
+        <p:sp>
+          <p:nvSpPr>
+            <p:cNvPr id="4" name="Rettangolo 3">
+              <a:extLst>
+                <a:ext uri="{FF2B5EF4-FFF2-40B4-BE49-F238E27FC236}">
+                  <a16:creationId xmlns:a16="http://schemas.microsoft.com/office/drawing/2014/main" id="{2654772C-12B6-4FE4-AA67-1D16A9F69948}"/>
+                </a:ext>
+              </a:extLst>
+            </p:cNvPr>
+            <p:cNvSpPr/>
+            <p:nvPr/>
+          </p:nvSpPr>
+          <p:spPr>
+            <a:xfrm>
+              <a:off x="1432095" y="3429000"/>
+              <a:ext cx="1593908" cy="713064"/>
+            </a:xfrm>
+            <a:prstGeom prst="rect">
+              <a:avLst/>
+            </a:prstGeom>
+          </p:spPr>
+          <p:style>
+            <a:lnRef idx="2">
+              <a:schemeClr val="accent1">
+                <a:shade val="50000"/>
+              </a:schemeClr>
+            </a:lnRef>
+            <a:fillRef idx="1">
+              <a:schemeClr val="accent1"/>
+            </a:fillRef>
+            <a:effectRef idx="0">
+              <a:schemeClr val="accent1"/>
+            </a:effectRef>
+            <a:fontRef idx="minor">
+              <a:schemeClr val="lt1"/>
+            </a:fontRef>
+          </p:style>
+          <p:txBody>
+            <a:bodyPr rtlCol="0" anchor="ctr"/>
+            <a:lstStyle/>
+            <a:p>
+              <a:pPr algn="ctr"/>
+              <a:r>
+                <a:rPr lang="it-IT" dirty="0"/>
+                <a:t>Data Management</a:t>
+              </a:r>
+              <a:endParaRPr lang="en-GB" dirty="0"/>
+            </a:p>
+          </p:txBody>
+        </p:sp>
+        <p:sp>
+          <p:nvSpPr>
+            <p:cNvPr id="5" name="Rettangolo 4">
+              <a:extLst>
+                <a:ext uri="{FF2B5EF4-FFF2-40B4-BE49-F238E27FC236}">
+                  <a16:creationId xmlns:a16="http://schemas.microsoft.com/office/drawing/2014/main" id="{3062F817-0803-4188-97B4-6A6AA49BB011}"/>
+                </a:ext>
+              </a:extLst>
+            </p:cNvPr>
+            <p:cNvSpPr/>
+            <p:nvPr/>
+          </p:nvSpPr>
+          <p:spPr>
+            <a:xfrm>
+              <a:off x="4619911" y="3429000"/>
+              <a:ext cx="1593908" cy="713064"/>
+            </a:xfrm>
+            <a:prstGeom prst="rect">
+              <a:avLst/>
+            </a:prstGeom>
+          </p:spPr>
+          <p:style>
+            <a:lnRef idx="2">
+              <a:schemeClr val="accent1">
+                <a:shade val="50000"/>
+              </a:schemeClr>
+            </a:lnRef>
+            <a:fillRef idx="1">
+              <a:schemeClr val="accent1"/>
+            </a:fillRef>
+            <a:effectRef idx="0">
+              <a:schemeClr val="accent1"/>
+            </a:effectRef>
+            <a:fontRef idx="minor">
+              <a:schemeClr val="lt1"/>
+            </a:fontRef>
+          </p:style>
+          <p:txBody>
+            <a:bodyPr rtlCol="0" anchor="ctr"/>
+            <a:lstStyle/>
+            <a:p>
+              <a:pPr algn="ctr"/>
+              <a:r>
+                <a:rPr lang="it-IT" dirty="0"/>
+                <a:t>UI Management</a:t>
+              </a:r>
+              <a:endParaRPr lang="en-GB" dirty="0"/>
+            </a:p>
+          </p:txBody>
+        </p:sp>
+        <p:cxnSp>
+          <p:nvCxnSpPr>
+            <p:cNvPr id="7" name="Connettore a gomito 6">
+              <a:extLst>
+                <a:ext uri="{FF2B5EF4-FFF2-40B4-BE49-F238E27FC236}">
+                  <a16:creationId xmlns:a16="http://schemas.microsoft.com/office/drawing/2014/main" id="{A0D07076-34D7-4907-8CF5-44CD49581093}"/>
+                </a:ext>
+              </a:extLst>
+            </p:cNvPr>
+            <p:cNvCxnSpPr>
+              <a:stCxn id="3" idx="1"/>
+              <a:endCxn id="4" idx="0"/>
+            </p:cNvCxnSpPr>
+            <p:nvPr/>
+          </p:nvCxnSpPr>
+          <p:spPr>
+            <a:xfrm rot="10800000" flipV="1">
+              <a:off x="2229049" y="2365182"/>
+              <a:ext cx="796954" cy="1063817"/>
+            </a:xfrm>
+            <a:prstGeom prst="bentConnector2">
+              <a:avLst/>
+            </a:prstGeom>
+            <a:ln>
+              <a:tailEnd type="triangle"/>
+            </a:ln>
+          </p:spPr>
+          <p:style>
+            <a:lnRef idx="1">
+              <a:schemeClr val="accent1"/>
+            </a:lnRef>
+            <a:fillRef idx="0">
+              <a:schemeClr val="accent1"/>
+            </a:fillRef>
+            <a:effectRef idx="0">
+              <a:schemeClr val="accent1"/>
+            </a:effectRef>
+            <a:fontRef idx="minor">
+              <a:schemeClr val="tx1"/>
+            </a:fontRef>
+          </p:style>
+        </p:cxnSp>
+        <p:cxnSp>
+          <p:nvCxnSpPr>
+            <p:cNvPr id="9" name="Connettore a gomito 8">
+              <a:extLst>
+                <a:ext uri="{FF2B5EF4-FFF2-40B4-BE49-F238E27FC236}">
+                  <a16:creationId xmlns:a16="http://schemas.microsoft.com/office/drawing/2014/main" id="{FEFB3977-3501-4A9E-B75F-9AEE2D00A90D}"/>
+                </a:ext>
+              </a:extLst>
+            </p:cNvPr>
+            <p:cNvCxnSpPr>
+              <a:stCxn id="3" idx="3"/>
+              <a:endCxn id="5" idx="0"/>
+            </p:cNvCxnSpPr>
+            <p:nvPr/>
+          </p:nvCxnSpPr>
+          <p:spPr>
+            <a:xfrm>
+              <a:off x="4619911" y="2365183"/>
+              <a:ext cx="796954" cy="1063817"/>
+            </a:xfrm>
+            <a:prstGeom prst="bentConnector2">
+              <a:avLst/>
+            </a:prstGeom>
+            <a:ln>
+              <a:tailEnd type="triangle"/>
+            </a:ln>
+          </p:spPr>
+          <p:style>
+            <a:lnRef idx="1">
+              <a:schemeClr val="accent1"/>
+            </a:lnRef>
+            <a:fillRef idx="0">
+              <a:schemeClr val="accent1"/>
+            </a:fillRef>
+            <a:effectRef idx="0">
+              <a:schemeClr val="accent1"/>
+            </a:effectRef>
+            <a:fontRef idx="minor">
+              <a:schemeClr val="tx1"/>
+            </a:fontRef>
+          </p:style>
+        </p:cxnSp>
+      </p:grpSp>
+      <p:pic>
+        <p:nvPicPr>
+          <p:cNvPr id="17" name="Immagine 16">
+            <a:extLst>
+              <a:ext uri="{FF2B5EF4-FFF2-40B4-BE49-F238E27FC236}">
+                <a16:creationId xmlns:a16="http://schemas.microsoft.com/office/drawing/2014/main" id="{2D9A8471-45F1-4A25-852F-D8C0822E1387}"/>
+              </a:ext>
+            </a:extLst>
+          </p:cNvPr>
+          <p:cNvPicPr>
+            <a:picLocks noChangeAspect="1"/>
+          </p:cNvPicPr>
+          <p:nvPr/>
+        </p:nvPicPr>
+        <p:blipFill>
+          <a:blip r:embed="rId2"/>
+          <a:stretch>
+            <a:fillRect/>
+          </a:stretch>
+        </p:blipFill>
+        <p:spPr>
+          <a:xfrm>
+            <a:off x="3264167" y="398433"/>
+            <a:ext cx="3868491" cy="1771827"/>
+          </a:xfrm>
+          <a:prstGeom prst="rect">
+            <a:avLst/>
+          </a:prstGeom>
+        </p:spPr>
+      </p:pic>
+      <p:grpSp>
+        <p:nvGrpSpPr>
+          <p:cNvPr id="48" name="Gruppo 47">
+            <a:extLst>
+              <a:ext uri="{FF2B5EF4-FFF2-40B4-BE49-F238E27FC236}">
+                <a16:creationId xmlns:a16="http://schemas.microsoft.com/office/drawing/2014/main" id="{7010B6FC-36EC-4D07-B13B-E470A91B3E59}"/>
+              </a:ext>
+            </a:extLst>
+          </p:cNvPr>
+          <p:cNvGrpSpPr/>
+          <p:nvPr/>
+        </p:nvGrpSpPr>
+        <p:grpSpPr>
+          <a:xfrm>
+            <a:off x="12192000" y="2911766"/>
+            <a:ext cx="5766120" cy="5418356"/>
+            <a:chOff x="4165602" y="902143"/>
+            <a:chExt cx="5766120" cy="5418356"/>
+          </a:xfrm>
+        </p:grpSpPr>
+        <p:sp>
+          <p:nvSpPr>
+            <p:cNvPr id="18" name="Rettangolo 17">
+              <a:extLst>
+                <a:ext uri="{FF2B5EF4-FFF2-40B4-BE49-F238E27FC236}">
+                  <a16:creationId xmlns:a16="http://schemas.microsoft.com/office/drawing/2014/main" id="{9FD48E46-71B0-4087-AA76-D9718E06DFD3}"/>
+                </a:ext>
+              </a:extLst>
+            </p:cNvPr>
+            <p:cNvSpPr/>
+            <p:nvPr/>
+          </p:nvSpPr>
+          <p:spPr>
+            <a:xfrm>
+              <a:off x="6838105" y="902143"/>
+              <a:ext cx="1593908" cy="713064"/>
+            </a:xfrm>
+            <a:prstGeom prst="rect">
+              <a:avLst/>
+            </a:prstGeom>
+          </p:spPr>
+          <p:style>
+            <a:lnRef idx="2">
+              <a:schemeClr val="accent1">
+                <a:shade val="50000"/>
+              </a:schemeClr>
+            </a:lnRef>
+            <a:fillRef idx="1">
+              <a:schemeClr val="accent1"/>
+            </a:fillRef>
+            <a:effectRef idx="0">
+              <a:schemeClr val="accent1"/>
+            </a:effectRef>
+            <a:fontRef idx="minor">
+              <a:schemeClr val="lt1"/>
+            </a:fontRef>
+          </p:style>
+          <p:txBody>
+            <a:bodyPr rtlCol="0" anchor="ctr"/>
+            <a:lstStyle/>
+            <a:p>
+              <a:pPr algn="ctr"/>
+              <a:r>
+                <a:rPr lang="it-IT" dirty="0"/>
+                <a:t>UI Management</a:t>
+              </a:r>
+              <a:endParaRPr lang="en-GB" dirty="0"/>
+            </a:p>
+          </p:txBody>
+        </p:sp>
+        <p:sp>
+          <p:nvSpPr>
+            <p:cNvPr id="19" name="Rettangolo 18">
+              <a:extLst>
+                <a:ext uri="{FF2B5EF4-FFF2-40B4-BE49-F238E27FC236}">
+                  <a16:creationId xmlns:a16="http://schemas.microsoft.com/office/drawing/2014/main" id="{4F540A78-A869-489D-99C6-6D1E262FF55F}"/>
+                </a:ext>
+              </a:extLst>
+            </p:cNvPr>
+            <p:cNvSpPr/>
+            <p:nvPr/>
+          </p:nvSpPr>
+          <p:spPr>
+            <a:xfrm>
+              <a:off x="6743906" y="3429000"/>
+              <a:ext cx="1593908" cy="713064"/>
+            </a:xfrm>
+            <a:prstGeom prst="rect">
+              <a:avLst/>
+            </a:prstGeom>
+          </p:spPr>
+          <p:style>
+            <a:lnRef idx="2">
+              <a:schemeClr val="accent1">
+                <a:shade val="50000"/>
+              </a:schemeClr>
+            </a:lnRef>
+            <a:fillRef idx="1">
+              <a:schemeClr val="accent1"/>
+            </a:fillRef>
+            <a:effectRef idx="0">
+              <a:schemeClr val="accent1"/>
+            </a:effectRef>
+            <a:fontRef idx="minor">
+              <a:schemeClr val="lt1"/>
+            </a:fontRef>
+          </p:style>
+          <p:txBody>
+            <a:bodyPr rtlCol="0" anchor="ctr"/>
+            <a:lstStyle/>
+            <a:p>
+              <a:pPr algn="ctr"/>
+              <a:r>
+                <a:rPr lang="it-IT" dirty="0" err="1"/>
+                <a:t>Wait</a:t>
+              </a:r>
+              <a:r>
+                <a:rPr lang="it-IT" dirty="0"/>
+                <a:t> for Event</a:t>
+              </a:r>
+              <a:endParaRPr lang="en-GB" dirty="0"/>
+            </a:p>
+          </p:txBody>
+        </p:sp>
+        <p:sp>
+          <p:nvSpPr>
+            <p:cNvPr id="20" name="Rettangolo 19">
+              <a:extLst>
+                <a:ext uri="{FF2B5EF4-FFF2-40B4-BE49-F238E27FC236}">
+                  <a16:creationId xmlns:a16="http://schemas.microsoft.com/office/drawing/2014/main" id="{D9D1DC0C-6A69-48C3-8A94-94B14F636316}"/>
+                </a:ext>
+              </a:extLst>
+            </p:cNvPr>
+            <p:cNvSpPr/>
+            <p:nvPr/>
+          </p:nvSpPr>
+          <p:spPr>
+            <a:xfrm>
+              <a:off x="5244197" y="2165571"/>
+              <a:ext cx="1593908" cy="713064"/>
+            </a:xfrm>
+            <a:prstGeom prst="rect">
+              <a:avLst/>
+            </a:prstGeom>
+          </p:spPr>
+          <p:style>
+            <a:lnRef idx="2">
+              <a:schemeClr val="accent1">
+                <a:shade val="50000"/>
+              </a:schemeClr>
+            </a:lnRef>
+            <a:fillRef idx="1">
+              <a:schemeClr val="accent1"/>
+            </a:fillRef>
+            <a:effectRef idx="0">
+              <a:schemeClr val="accent1"/>
+            </a:effectRef>
+            <a:fontRef idx="minor">
+              <a:schemeClr val="lt1"/>
+            </a:fontRef>
+          </p:style>
+          <p:txBody>
+            <a:bodyPr rtlCol="0" anchor="ctr"/>
+            <a:lstStyle/>
+            <a:p>
+              <a:pPr algn="ctr"/>
+              <a:r>
+                <a:rPr lang="it-IT" dirty="0"/>
+                <a:t>Message from Prompt</a:t>
+              </a:r>
+              <a:endParaRPr lang="en-GB" dirty="0"/>
+            </a:p>
+          </p:txBody>
+        </p:sp>
+        <p:sp>
+          <p:nvSpPr>
+            <p:cNvPr id="21" name="Rettangolo 20">
+              <a:extLst>
+                <a:ext uri="{FF2B5EF4-FFF2-40B4-BE49-F238E27FC236}">
+                  <a16:creationId xmlns:a16="http://schemas.microsoft.com/office/drawing/2014/main" id="{41EA6290-2395-48F4-8061-7B97A0ABC286}"/>
+                </a:ext>
+              </a:extLst>
+            </p:cNvPr>
+            <p:cNvSpPr/>
+            <p:nvPr/>
+          </p:nvSpPr>
+          <p:spPr>
+            <a:xfrm>
+              <a:off x="8337814" y="2190503"/>
+              <a:ext cx="1593908" cy="713064"/>
+            </a:xfrm>
+            <a:prstGeom prst="rect">
+              <a:avLst/>
+            </a:prstGeom>
+          </p:spPr>
+          <p:style>
+            <a:lnRef idx="2">
+              <a:schemeClr val="accent1">
+                <a:shade val="50000"/>
+              </a:schemeClr>
+            </a:lnRef>
+            <a:fillRef idx="1">
+              <a:schemeClr val="accent1"/>
+            </a:fillRef>
+            <a:effectRef idx="0">
+              <a:schemeClr val="accent1"/>
+            </a:effectRef>
+            <a:fontRef idx="minor">
+              <a:schemeClr val="lt1"/>
+            </a:fontRef>
+          </p:style>
+          <p:txBody>
+            <a:bodyPr rtlCol="0" anchor="ctr"/>
+            <a:lstStyle/>
+            <a:p>
+              <a:pPr algn="ctr"/>
+              <a:r>
+                <a:rPr lang="it-IT" dirty="0"/>
+                <a:t>Message from Data M.</a:t>
+              </a:r>
+              <a:endParaRPr lang="en-GB" dirty="0"/>
+            </a:p>
+          </p:txBody>
+        </p:sp>
+        <p:cxnSp>
+          <p:nvCxnSpPr>
+            <p:cNvPr id="23" name="Connettore a gomito 22">
+              <a:extLst>
+                <a:ext uri="{FF2B5EF4-FFF2-40B4-BE49-F238E27FC236}">
+                  <a16:creationId xmlns:a16="http://schemas.microsoft.com/office/drawing/2014/main" id="{2D86E767-E698-49D1-8AE1-C86B5DAD6A67}"/>
+                </a:ext>
+              </a:extLst>
+            </p:cNvPr>
+            <p:cNvCxnSpPr>
+              <a:cxnSpLocks/>
+              <a:stCxn id="20" idx="2"/>
+              <a:endCxn id="19" idx="1"/>
+            </p:cNvCxnSpPr>
+            <p:nvPr/>
+          </p:nvCxnSpPr>
+          <p:spPr>
+            <a:xfrm rot="16200000" flipH="1">
+              <a:off x="5939080" y="2980705"/>
+              <a:ext cx="906897" cy="702755"/>
+            </a:xfrm>
+            <a:prstGeom prst="bentConnector2">
+              <a:avLst/>
+            </a:prstGeom>
+            <a:ln>
+              <a:tailEnd type="triangle"/>
+            </a:ln>
+          </p:spPr>
+          <p:style>
+            <a:lnRef idx="1">
+              <a:schemeClr val="accent1"/>
+            </a:lnRef>
+            <a:fillRef idx="0">
+              <a:schemeClr val="accent1"/>
+            </a:fillRef>
+            <a:effectRef idx="0">
+              <a:schemeClr val="accent1"/>
+            </a:effectRef>
+            <a:fontRef idx="minor">
+              <a:schemeClr val="tx1"/>
+            </a:fontRef>
+          </p:style>
+        </p:cxnSp>
+        <p:cxnSp>
+          <p:nvCxnSpPr>
+            <p:cNvPr id="25" name="Connettore a gomito 24">
+              <a:extLst>
+                <a:ext uri="{FF2B5EF4-FFF2-40B4-BE49-F238E27FC236}">
+                  <a16:creationId xmlns:a16="http://schemas.microsoft.com/office/drawing/2014/main" id="{1E005E39-2B4D-4C56-B9B2-CE79C1CB2DE5}"/>
+                </a:ext>
+              </a:extLst>
+            </p:cNvPr>
+            <p:cNvCxnSpPr>
+              <a:cxnSpLocks/>
+              <a:stCxn id="21" idx="2"/>
+              <a:endCxn id="19" idx="3"/>
+            </p:cNvCxnSpPr>
+            <p:nvPr/>
+          </p:nvCxnSpPr>
+          <p:spPr>
+            <a:xfrm rot="5400000">
+              <a:off x="8295309" y="2946072"/>
+              <a:ext cx="881965" cy="796954"/>
+            </a:xfrm>
+            <a:prstGeom prst="bentConnector2">
+              <a:avLst/>
+            </a:prstGeom>
+            <a:ln>
+              <a:tailEnd type="triangle"/>
+            </a:ln>
+          </p:spPr>
+          <p:style>
+            <a:lnRef idx="1">
+              <a:schemeClr val="accent1"/>
+            </a:lnRef>
+            <a:fillRef idx="0">
+              <a:schemeClr val="accent1"/>
+            </a:fillRef>
+            <a:effectRef idx="0">
+              <a:schemeClr val="accent1"/>
+            </a:effectRef>
+            <a:fontRef idx="minor">
+              <a:schemeClr val="tx1"/>
+            </a:fontRef>
+          </p:style>
+        </p:cxnSp>
+        <p:sp>
+          <p:nvSpPr>
+            <p:cNvPr id="30" name="Rettangolo 29">
+              <a:extLst>
+                <a:ext uri="{FF2B5EF4-FFF2-40B4-BE49-F238E27FC236}">
+                  <a16:creationId xmlns:a16="http://schemas.microsoft.com/office/drawing/2014/main" id="{637A9007-0CBF-4F11-AE16-8F0E0139AC01}"/>
+                </a:ext>
+              </a:extLst>
+            </p:cNvPr>
+            <p:cNvSpPr/>
+            <p:nvPr/>
+          </p:nvSpPr>
+          <p:spPr>
+            <a:xfrm>
+              <a:off x="5244197" y="4498593"/>
+              <a:ext cx="1593908" cy="713064"/>
+            </a:xfrm>
+            <a:prstGeom prst="rect">
+              <a:avLst/>
+            </a:prstGeom>
+          </p:spPr>
+          <p:style>
+            <a:lnRef idx="2">
+              <a:schemeClr val="accent1">
+                <a:shade val="50000"/>
+              </a:schemeClr>
+            </a:lnRef>
+            <a:fillRef idx="1">
+              <a:schemeClr val="accent1"/>
+            </a:fillRef>
+            <a:effectRef idx="0">
+              <a:schemeClr val="accent1"/>
+            </a:effectRef>
+            <a:fontRef idx="minor">
+              <a:schemeClr val="lt1"/>
+            </a:fontRef>
+          </p:style>
+          <p:txBody>
+            <a:bodyPr rtlCol="0" anchor="ctr"/>
+            <a:lstStyle/>
+            <a:p>
+              <a:pPr algn="ctr"/>
+              <a:r>
+                <a:rPr lang="it-IT" dirty="0" err="1"/>
+                <a:t>Decode</a:t>
+              </a:r>
+              <a:r>
+                <a:rPr lang="it-IT" dirty="0"/>
+                <a:t> Message</a:t>
+              </a:r>
+              <a:endParaRPr lang="en-GB" dirty="0"/>
+            </a:p>
+          </p:txBody>
+        </p:sp>
+        <p:sp>
+          <p:nvSpPr>
+            <p:cNvPr id="31" name="Rettangolo 30">
+              <a:extLst>
+                <a:ext uri="{FF2B5EF4-FFF2-40B4-BE49-F238E27FC236}">
+                  <a16:creationId xmlns:a16="http://schemas.microsoft.com/office/drawing/2014/main" id="{D8E19B06-C3BC-4215-9E5C-FBF7F3F1ADCC}"/>
+                </a:ext>
+              </a:extLst>
+            </p:cNvPr>
+            <p:cNvSpPr/>
+            <p:nvPr/>
+          </p:nvSpPr>
+          <p:spPr>
+            <a:xfrm>
+              <a:off x="4165602" y="5580505"/>
+              <a:ext cx="1593908" cy="713064"/>
+            </a:xfrm>
+            <a:prstGeom prst="rect">
+              <a:avLst/>
+            </a:prstGeom>
+          </p:spPr>
+          <p:style>
+            <a:lnRef idx="2">
+              <a:schemeClr val="accent1">
+                <a:shade val="50000"/>
+              </a:schemeClr>
+            </a:lnRef>
+            <a:fillRef idx="1">
+              <a:schemeClr val="accent1"/>
+            </a:fillRef>
+            <a:effectRef idx="0">
+              <a:schemeClr val="accent1"/>
+            </a:effectRef>
+            <a:fontRef idx="minor">
+              <a:schemeClr val="lt1"/>
+            </a:fontRef>
+          </p:style>
+          <p:txBody>
+            <a:bodyPr rtlCol="0" anchor="ctr"/>
+            <a:lstStyle/>
+            <a:p>
+              <a:pPr algn="ctr"/>
+              <a:r>
+                <a:rPr lang="it-IT" dirty="0"/>
+                <a:t>Exit</a:t>
+              </a:r>
+              <a:endParaRPr lang="en-GB" dirty="0"/>
+            </a:p>
+          </p:txBody>
+        </p:sp>
+        <p:sp>
+          <p:nvSpPr>
+            <p:cNvPr id="32" name="Rettangolo 31">
+              <a:extLst>
+                <a:ext uri="{FF2B5EF4-FFF2-40B4-BE49-F238E27FC236}">
+                  <a16:creationId xmlns:a16="http://schemas.microsoft.com/office/drawing/2014/main" id="{7AF9EA8A-64B4-406A-9219-6FACADD033E7}"/>
+                </a:ext>
+              </a:extLst>
+            </p:cNvPr>
+            <p:cNvSpPr/>
+            <p:nvPr/>
+          </p:nvSpPr>
+          <p:spPr>
+            <a:xfrm>
+              <a:off x="6096000" y="5607435"/>
+              <a:ext cx="1593908" cy="713064"/>
+            </a:xfrm>
+            <a:prstGeom prst="rect">
+              <a:avLst/>
+            </a:prstGeom>
+          </p:spPr>
+          <p:style>
+            <a:lnRef idx="2">
+              <a:schemeClr val="accent1">
+                <a:shade val="50000"/>
+              </a:schemeClr>
+            </a:lnRef>
+            <a:fillRef idx="1">
+              <a:schemeClr val="accent1"/>
+            </a:fillRef>
+            <a:effectRef idx="0">
+              <a:schemeClr val="accent1"/>
+            </a:effectRef>
+            <a:fontRef idx="minor">
+              <a:schemeClr val="lt1"/>
+            </a:fontRef>
+          </p:style>
+          <p:txBody>
+            <a:bodyPr rtlCol="0" anchor="ctr"/>
+            <a:lstStyle/>
+            <a:p>
+              <a:pPr algn="ctr"/>
+              <a:r>
+                <a:rPr lang="it-IT" dirty="0" err="1"/>
+                <a:t>Send</a:t>
+              </a:r>
+              <a:r>
+                <a:rPr lang="it-IT" dirty="0"/>
+                <a:t> Data To Ring</a:t>
+              </a:r>
+              <a:endParaRPr lang="en-GB" dirty="0"/>
+            </a:p>
+          </p:txBody>
+        </p:sp>
+        <p:cxnSp>
+          <p:nvCxnSpPr>
+            <p:cNvPr id="34" name="Connettore a gomito 33">
+              <a:extLst>
+                <a:ext uri="{FF2B5EF4-FFF2-40B4-BE49-F238E27FC236}">
+                  <a16:creationId xmlns:a16="http://schemas.microsoft.com/office/drawing/2014/main" id="{16A94F2F-D771-4EBD-A219-4B0A6F73954B}"/>
+                </a:ext>
+              </a:extLst>
+            </p:cNvPr>
+            <p:cNvCxnSpPr>
+              <a:stCxn id="19" idx="2"/>
+              <a:endCxn id="30" idx="0"/>
+            </p:cNvCxnSpPr>
+            <p:nvPr/>
+          </p:nvCxnSpPr>
+          <p:spPr>
+            <a:xfrm rot="5400000">
+              <a:off x="6612742" y="3570474"/>
+              <a:ext cx="356529" cy="1499709"/>
+            </a:xfrm>
+            <a:prstGeom prst="bentConnector3">
+              <a:avLst/>
+            </a:prstGeom>
+            <a:ln>
+              <a:tailEnd type="triangle"/>
+            </a:ln>
+          </p:spPr>
+          <p:style>
+            <a:lnRef idx="1">
+              <a:schemeClr val="accent1"/>
+            </a:lnRef>
+            <a:fillRef idx="0">
+              <a:schemeClr val="accent1"/>
+            </a:fillRef>
+            <a:effectRef idx="0">
+              <a:schemeClr val="accent1"/>
+            </a:effectRef>
+            <a:fontRef idx="minor">
+              <a:schemeClr val="tx1"/>
+            </a:fontRef>
+          </p:style>
+        </p:cxnSp>
+        <p:cxnSp>
+          <p:nvCxnSpPr>
+            <p:cNvPr id="36" name="Connettore a gomito 35">
+              <a:extLst>
+                <a:ext uri="{FF2B5EF4-FFF2-40B4-BE49-F238E27FC236}">
+                  <a16:creationId xmlns:a16="http://schemas.microsoft.com/office/drawing/2014/main" id="{78CAE276-2E01-4A73-9F4B-59985D20B48C}"/>
+                </a:ext>
+              </a:extLst>
+            </p:cNvPr>
+            <p:cNvCxnSpPr>
+              <a:stCxn id="30" idx="2"/>
+              <a:endCxn id="31" idx="0"/>
+            </p:cNvCxnSpPr>
+            <p:nvPr/>
+          </p:nvCxnSpPr>
+          <p:spPr>
+            <a:xfrm rot="5400000">
+              <a:off x="5317430" y="4856784"/>
+              <a:ext cx="368848" cy="1078595"/>
+            </a:xfrm>
+            <a:prstGeom prst="bentConnector3">
+              <a:avLst/>
+            </a:prstGeom>
+            <a:ln>
+              <a:tailEnd type="triangle"/>
+            </a:ln>
+          </p:spPr>
+          <p:style>
+            <a:lnRef idx="1">
+              <a:schemeClr val="accent1"/>
+            </a:lnRef>
+            <a:fillRef idx="0">
+              <a:schemeClr val="accent1"/>
+            </a:fillRef>
+            <a:effectRef idx="0">
+              <a:schemeClr val="accent1"/>
+            </a:effectRef>
+            <a:fontRef idx="minor">
+              <a:schemeClr val="tx1"/>
+            </a:fontRef>
+          </p:style>
+        </p:cxnSp>
+        <p:cxnSp>
+          <p:nvCxnSpPr>
+            <p:cNvPr id="38" name="Connettore a gomito 37">
+              <a:extLst>
+                <a:ext uri="{FF2B5EF4-FFF2-40B4-BE49-F238E27FC236}">
+                  <a16:creationId xmlns:a16="http://schemas.microsoft.com/office/drawing/2014/main" id="{EB631BC3-3F37-4ECA-A1C1-D4F775031DD7}"/>
+                </a:ext>
+              </a:extLst>
+            </p:cNvPr>
+            <p:cNvCxnSpPr>
+              <a:stCxn id="30" idx="2"/>
+              <a:endCxn id="32" idx="0"/>
+            </p:cNvCxnSpPr>
+            <p:nvPr/>
+          </p:nvCxnSpPr>
+          <p:spPr>
+            <a:xfrm rot="16200000" flipH="1">
+              <a:off x="6269163" y="4983644"/>
+              <a:ext cx="395778" cy="851803"/>
+            </a:xfrm>
+            <a:prstGeom prst="bentConnector3">
+              <a:avLst/>
+            </a:prstGeom>
+            <a:ln>
+              <a:tailEnd type="triangle"/>
+            </a:ln>
+          </p:spPr>
+          <p:style>
+            <a:lnRef idx="1">
+              <a:schemeClr val="accent1"/>
+            </a:lnRef>
+            <a:fillRef idx="0">
+              <a:schemeClr val="accent1"/>
+            </a:fillRef>
+            <a:effectRef idx="0">
+              <a:schemeClr val="accent1"/>
+            </a:effectRef>
+            <a:fontRef idx="minor">
+              <a:schemeClr val="tx1"/>
+            </a:fontRef>
+          </p:style>
+        </p:cxnSp>
+        <p:cxnSp>
+          <p:nvCxnSpPr>
+            <p:cNvPr id="40" name="Connettore a gomito 39">
+              <a:extLst>
+                <a:ext uri="{FF2B5EF4-FFF2-40B4-BE49-F238E27FC236}">
+                  <a16:creationId xmlns:a16="http://schemas.microsoft.com/office/drawing/2014/main" id="{59DB1A53-D67D-41D9-8B24-C3855E89B838}"/>
+                </a:ext>
+              </a:extLst>
+            </p:cNvPr>
+            <p:cNvCxnSpPr>
+              <a:stCxn id="19" idx="1"/>
+              <a:endCxn id="30" idx="0"/>
+            </p:cNvCxnSpPr>
+            <p:nvPr/>
+          </p:nvCxnSpPr>
+          <p:spPr>
+            <a:xfrm rot="10800000" flipV="1">
+              <a:off x="6041152" y="3785531"/>
+              <a:ext cx="702755" cy="713061"/>
+            </a:xfrm>
+            <a:prstGeom prst="bentConnector2">
+              <a:avLst/>
+            </a:prstGeom>
+            <a:ln w="9525" cap="flat" cmpd="sng" algn="ctr">
+              <a:solidFill>
+                <a:schemeClr val="accent5"/>
+              </a:solidFill>
+              <a:prstDash val="dash"/>
+              <a:round/>
+              <a:headEnd type="none" w="med" len="med"/>
+              <a:tailEnd type="none" w="med" len="med"/>
+            </a:ln>
+          </p:spPr>
+          <p:style>
+            <a:lnRef idx="0">
+              <a:scrgbClr r="0" g="0" b="0"/>
+            </a:lnRef>
+            <a:fillRef idx="0">
+              <a:scrgbClr r="0" g="0" b="0"/>
+            </a:fillRef>
+            <a:effectRef idx="0">
+              <a:scrgbClr r="0" g="0" b="0"/>
+            </a:effectRef>
+            <a:fontRef idx="minor">
+              <a:schemeClr val="tx1"/>
+            </a:fontRef>
+          </p:style>
+        </p:cxnSp>
+        <p:sp>
+          <p:nvSpPr>
+            <p:cNvPr id="41" name="Rettangolo 40">
+              <a:extLst>
+                <a:ext uri="{FF2B5EF4-FFF2-40B4-BE49-F238E27FC236}">
+                  <a16:creationId xmlns:a16="http://schemas.microsoft.com/office/drawing/2014/main" id="{6A7E2F35-AE58-4C13-95FA-1E1DB081BFBF}"/>
+                </a:ext>
+              </a:extLst>
+            </p:cNvPr>
+            <p:cNvSpPr/>
+            <p:nvPr/>
+          </p:nvSpPr>
+          <p:spPr>
+            <a:xfrm>
+              <a:off x="8337814" y="4479866"/>
+              <a:ext cx="1593908" cy="713064"/>
+            </a:xfrm>
+            <a:prstGeom prst="rect">
+              <a:avLst/>
+            </a:prstGeom>
+          </p:spPr>
+          <p:style>
+            <a:lnRef idx="2">
+              <a:schemeClr val="accent1">
+                <a:shade val="50000"/>
+              </a:schemeClr>
+            </a:lnRef>
+            <a:fillRef idx="1">
+              <a:schemeClr val="accent1"/>
+            </a:fillRef>
+            <a:effectRef idx="0">
+              <a:schemeClr val="accent1"/>
+            </a:effectRef>
+            <a:fontRef idx="minor">
+              <a:schemeClr val="lt1"/>
+            </a:fontRef>
+          </p:style>
+          <p:txBody>
+            <a:bodyPr rtlCol="0" anchor="ctr"/>
+            <a:lstStyle/>
+            <a:p>
+              <a:pPr algn="ctr"/>
+              <a:r>
+                <a:rPr lang="it-IT" dirty="0" err="1"/>
+                <a:t>Send</a:t>
+              </a:r>
+              <a:r>
+                <a:rPr lang="it-IT" dirty="0"/>
+                <a:t> Data to Prompt</a:t>
+              </a:r>
+              <a:endParaRPr lang="en-GB" dirty="0"/>
+            </a:p>
+          </p:txBody>
+        </p:sp>
+        <p:cxnSp>
+          <p:nvCxnSpPr>
+            <p:cNvPr id="43" name="Connettore a gomito 42">
+              <a:extLst>
+                <a:ext uri="{FF2B5EF4-FFF2-40B4-BE49-F238E27FC236}">
+                  <a16:creationId xmlns:a16="http://schemas.microsoft.com/office/drawing/2014/main" id="{006B7BA5-2F50-4126-B32E-C2B357317195}"/>
+                </a:ext>
+              </a:extLst>
+            </p:cNvPr>
+            <p:cNvCxnSpPr>
+              <a:stCxn id="19" idx="2"/>
+              <a:endCxn id="41" idx="0"/>
+            </p:cNvCxnSpPr>
+            <p:nvPr/>
+          </p:nvCxnSpPr>
+          <p:spPr>
+            <a:xfrm rot="16200000" flipH="1">
+              <a:off x="8168913" y="3514011"/>
+              <a:ext cx="337802" cy="1593908"/>
+            </a:xfrm>
+            <a:prstGeom prst="bentConnector3">
+              <a:avLst/>
+            </a:prstGeom>
+            <a:ln>
+              <a:tailEnd type="triangle"/>
+            </a:ln>
+          </p:spPr>
+          <p:style>
+            <a:lnRef idx="1">
+              <a:schemeClr val="accent1"/>
+            </a:lnRef>
+            <a:fillRef idx="0">
+              <a:schemeClr val="accent1"/>
+            </a:fillRef>
+            <a:effectRef idx="0">
+              <a:schemeClr val="accent1"/>
+            </a:effectRef>
+            <a:fontRef idx="minor">
+              <a:schemeClr val="tx1"/>
+            </a:fontRef>
+          </p:style>
+        </p:cxnSp>
+        <p:cxnSp>
+          <p:nvCxnSpPr>
+            <p:cNvPr id="45" name="Connettore a gomito 44">
+              <a:extLst>
+                <a:ext uri="{FF2B5EF4-FFF2-40B4-BE49-F238E27FC236}">
+                  <a16:creationId xmlns:a16="http://schemas.microsoft.com/office/drawing/2014/main" id="{80035198-3C2A-4A61-BF09-D6C9702A82AF}"/>
+                </a:ext>
+              </a:extLst>
+            </p:cNvPr>
+            <p:cNvCxnSpPr>
+              <a:stCxn id="21" idx="2"/>
+              <a:endCxn id="41" idx="0"/>
+            </p:cNvCxnSpPr>
+            <p:nvPr/>
+          </p:nvCxnSpPr>
+          <p:spPr>
+            <a:xfrm rot="5400000">
+              <a:off x="8346619" y="3691716"/>
+              <a:ext cx="1576299" cy="12700"/>
+            </a:xfrm>
+            <a:prstGeom prst="bentConnector3">
+              <a:avLst/>
+            </a:prstGeom>
+            <a:ln w="9525" cap="flat" cmpd="sng" algn="ctr">
+              <a:solidFill>
+                <a:schemeClr val="accent1"/>
+              </a:solidFill>
+              <a:prstDash val="dash"/>
+              <a:round/>
+              <a:headEnd type="none" w="med" len="med"/>
+              <a:tailEnd type="none" w="med" len="med"/>
+            </a:ln>
+          </p:spPr>
+          <p:style>
+            <a:lnRef idx="0">
+              <a:scrgbClr r="0" g="0" b="0"/>
+            </a:lnRef>
+            <a:fillRef idx="0">
+              <a:scrgbClr r="0" g="0" b="0"/>
+            </a:fillRef>
+            <a:effectRef idx="0">
+              <a:scrgbClr r="0" g="0" b="0"/>
+            </a:effectRef>
+            <a:fontRef idx="minor">
+              <a:schemeClr val="tx1"/>
+            </a:fontRef>
+          </p:style>
+        </p:cxnSp>
+      </p:grpSp>
+      <p:pic>
+        <p:nvPicPr>
+          <p:cNvPr id="49" name="Immagine 48">
+            <a:extLst>
+              <a:ext uri="{FF2B5EF4-FFF2-40B4-BE49-F238E27FC236}">
+                <a16:creationId xmlns:a16="http://schemas.microsoft.com/office/drawing/2014/main" id="{10A7EB13-8DFF-401C-9AF3-64ED27694303}"/>
+              </a:ext>
+            </a:extLst>
+          </p:cNvPr>
+          <p:cNvPicPr>
+            <a:picLocks noChangeAspect="1"/>
+          </p:cNvPicPr>
+          <p:nvPr/>
+        </p:nvPicPr>
+        <p:blipFill>
+          <a:blip r:embed="rId3"/>
+          <a:stretch>
+            <a:fillRect/>
+          </a:stretch>
+        </p:blipFill>
+        <p:spPr>
+          <a:xfrm>
+            <a:off x="325580" y="2911766"/>
+            <a:ext cx="4012239" cy="3777213"/>
+          </a:xfrm>
+          <a:prstGeom prst="rect">
+            <a:avLst/>
+          </a:prstGeom>
+        </p:spPr>
+      </p:pic>
+      <p:grpSp>
+        <p:nvGrpSpPr>
+          <p:cNvPr id="80" name="Gruppo 79">
+            <a:extLst>
+              <a:ext uri="{FF2B5EF4-FFF2-40B4-BE49-F238E27FC236}">
+                <a16:creationId xmlns:a16="http://schemas.microsoft.com/office/drawing/2014/main" id="{84C267D8-C0B8-45EB-B866-E74329076F29}"/>
+              </a:ext>
+            </a:extLst>
+          </p:cNvPr>
+          <p:cNvGrpSpPr/>
+          <p:nvPr/>
+        </p:nvGrpSpPr>
+        <p:grpSpPr>
+          <a:xfrm>
+            <a:off x="13798357" y="1813728"/>
+            <a:ext cx="5928663" cy="5125899"/>
+            <a:chOff x="5379975" y="475422"/>
+            <a:chExt cx="5928663" cy="5125899"/>
+          </a:xfrm>
+        </p:grpSpPr>
+        <p:sp>
+          <p:nvSpPr>
+            <p:cNvPr id="50" name="Rettangolo 49">
+              <a:extLst>
+                <a:ext uri="{FF2B5EF4-FFF2-40B4-BE49-F238E27FC236}">
+                  <a16:creationId xmlns:a16="http://schemas.microsoft.com/office/drawing/2014/main" id="{84D198C4-44F4-4213-BE90-8E516F88F1E4}"/>
+                </a:ext>
+              </a:extLst>
+            </p:cNvPr>
+            <p:cNvSpPr/>
+            <p:nvPr/>
+          </p:nvSpPr>
+          <p:spPr>
+            <a:xfrm>
+              <a:off x="5410862" y="475422"/>
+              <a:ext cx="1593908" cy="713064"/>
+            </a:xfrm>
+            <a:prstGeom prst="rect">
+              <a:avLst/>
+            </a:prstGeom>
+          </p:spPr>
+          <p:style>
+            <a:lnRef idx="2">
+              <a:schemeClr val="accent1">
+                <a:shade val="50000"/>
+              </a:schemeClr>
+            </a:lnRef>
+            <a:fillRef idx="1">
+              <a:schemeClr val="accent1"/>
+            </a:fillRef>
+            <a:effectRef idx="0">
+              <a:schemeClr val="accent1"/>
+            </a:effectRef>
+            <a:fontRef idx="minor">
+              <a:schemeClr val="lt1"/>
+            </a:fontRef>
+          </p:style>
+          <p:txBody>
+            <a:bodyPr rtlCol="0" anchor="ctr"/>
+            <a:lstStyle/>
+            <a:p>
+              <a:pPr algn="ctr"/>
+              <a:r>
+                <a:rPr lang="it-IT" dirty="0"/>
+                <a:t>Data Management</a:t>
+              </a:r>
+              <a:endParaRPr lang="en-GB" dirty="0"/>
+            </a:p>
+          </p:txBody>
+        </p:sp>
+        <p:sp>
+          <p:nvSpPr>
+            <p:cNvPr id="51" name="Rettangolo 50">
+              <a:extLst>
+                <a:ext uri="{FF2B5EF4-FFF2-40B4-BE49-F238E27FC236}">
+                  <a16:creationId xmlns:a16="http://schemas.microsoft.com/office/drawing/2014/main" id="{8EF857E7-8C88-4531-85B3-38DF311ADDD6}"/>
+                </a:ext>
+              </a:extLst>
+            </p:cNvPr>
+            <p:cNvSpPr/>
+            <p:nvPr/>
+          </p:nvSpPr>
+          <p:spPr>
+            <a:xfrm>
+              <a:off x="5379975" y="1952126"/>
+              <a:ext cx="1593908" cy="713064"/>
+            </a:xfrm>
+            <a:prstGeom prst="rect">
+              <a:avLst/>
+            </a:prstGeom>
+          </p:spPr>
+          <p:style>
+            <a:lnRef idx="2">
+              <a:schemeClr val="accent1">
+                <a:shade val="50000"/>
+              </a:schemeClr>
+            </a:lnRef>
+            <a:fillRef idx="1">
+              <a:schemeClr val="accent1"/>
+            </a:fillRef>
+            <a:effectRef idx="0">
+              <a:schemeClr val="accent1"/>
+            </a:effectRef>
+            <a:fontRef idx="minor">
+              <a:schemeClr val="lt1"/>
+            </a:fontRef>
+          </p:style>
+          <p:txBody>
+            <a:bodyPr rtlCol="0" anchor="ctr"/>
+            <a:lstStyle/>
+            <a:p>
+              <a:pPr algn="ctr"/>
+              <a:r>
+                <a:rPr lang="it-IT" dirty="0" err="1"/>
+                <a:t>Wait</a:t>
+              </a:r>
+              <a:r>
+                <a:rPr lang="it-IT" dirty="0"/>
+                <a:t> for Data</a:t>
+              </a:r>
+              <a:endParaRPr lang="en-GB" dirty="0"/>
+            </a:p>
+          </p:txBody>
+        </p:sp>
+        <p:sp>
+          <p:nvSpPr>
+            <p:cNvPr id="52" name="Rettangolo 51">
+              <a:extLst>
+                <a:ext uri="{FF2B5EF4-FFF2-40B4-BE49-F238E27FC236}">
+                  <a16:creationId xmlns:a16="http://schemas.microsoft.com/office/drawing/2014/main" id="{B6D2D3CB-6311-4271-9D1A-0C2A4060235A}"/>
+                </a:ext>
+              </a:extLst>
+            </p:cNvPr>
+            <p:cNvSpPr/>
+            <p:nvPr/>
+          </p:nvSpPr>
+          <p:spPr>
+            <a:xfrm>
+              <a:off x="5379975" y="3179778"/>
+              <a:ext cx="1593908" cy="713064"/>
+            </a:xfrm>
+            <a:prstGeom prst="rect">
+              <a:avLst/>
+            </a:prstGeom>
+          </p:spPr>
+          <p:style>
+            <a:lnRef idx="2">
+              <a:schemeClr val="accent1">
+                <a:shade val="50000"/>
+              </a:schemeClr>
+            </a:lnRef>
+            <a:fillRef idx="1">
+              <a:schemeClr val="accent1"/>
+            </a:fillRef>
+            <a:effectRef idx="0">
+              <a:schemeClr val="accent1"/>
+            </a:effectRef>
+            <a:fontRef idx="minor">
+              <a:schemeClr val="lt1"/>
+            </a:fontRef>
+          </p:style>
+          <p:txBody>
+            <a:bodyPr rtlCol="0" anchor="ctr"/>
+            <a:lstStyle/>
+            <a:p>
+              <a:pPr algn="ctr"/>
+              <a:r>
+                <a:rPr lang="it-IT" dirty="0" err="1"/>
+                <a:t>Decode</a:t>
+              </a:r>
+              <a:r>
+                <a:rPr lang="it-IT" dirty="0"/>
+                <a:t> Data</a:t>
+              </a:r>
+              <a:endParaRPr lang="en-GB" dirty="0"/>
+            </a:p>
+          </p:txBody>
+        </p:sp>
+        <p:sp>
+          <p:nvSpPr>
+            <p:cNvPr id="53" name="Rombo 52">
+              <a:extLst>
+                <a:ext uri="{FF2B5EF4-FFF2-40B4-BE49-F238E27FC236}">
+                  <a16:creationId xmlns:a16="http://schemas.microsoft.com/office/drawing/2014/main" id="{4D7BBE0E-5EFB-46E6-B3AC-BBD3641C9926}"/>
+                </a:ext>
+              </a:extLst>
+            </p:cNvPr>
+            <p:cNvSpPr/>
+            <p:nvPr/>
+          </p:nvSpPr>
+          <p:spPr>
+            <a:xfrm>
+              <a:off x="7657215" y="2977677"/>
+              <a:ext cx="1468016" cy="1117265"/>
+            </a:xfrm>
+            <a:prstGeom prst="diamond">
+              <a:avLst/>
+            </a:prstGeom>
+          </p:spPr>
+          <p:style>
+            <a:lnRef idx="2">
+              <a:schemeClr val="accent1">
+                <a:shade val="50000"/>
+              </a:schemeClr>
+            </a:lnRef>
+            <a:fillRef idx="1">
+              <a:schemeClr val="accent1"/>
+            </a:fillRef>
+            <a:effectRef idx="0">
+              <a:schemeClr val="accent1"/>
+            </a:effectRef>
+            <a:fontRef idx="minor">
+              <a:schemeClr val="lt1"/>
+            </a:fontRef>
+          </p:style>
+          <p:txBody>
+            <a:bodyPr rtlCol="0" anchor="ctr"/>
+            <a:lstStyle/>
+            <a:p>
+              <a:pPr algn="ctr"/>
+              <a:r>
+                <a:rPr lang="it-IT" sz="1200" dirty="0" err="1"/>
+                <a:t>is</a:t>
+              </a:r>
+              <a:r>
+                <a:rPr lang="it-IT" sz="1200" dirty="0"/>
+                <a:t> CONF?</a:t>
+              </a:r>
+              <a:endParaRPr lang="en-GB" sz="1200" dirty="0"/>
+            </a:p>
+          </p:txBody>
+        </p:sp>
+        <p:sp>
+          <p:nvSpPr>
+            <p:cNvPr id="55" name="Rombo 54">
+              <a:extLst>
+                <a:ext uri="{FF2B5EF4-FFF2-40B4-BE49-F238E27FC236}">
+                  <a16:creationId xmlns:a16="http://schemas.microsoft.com/office/drawing/2014/main" id="{45D85DEE-263B-4546-99A1-92A2387380F1}"/>
+                </a:ext>
+              </a:extLst>
+            </p:cNvPr>
+            <p:cNvSpPr/>
+            <p:nvPr/>
+          </p:nvSpPr>
+          <p:spPr>
+            <a:xfrm>
+              <a:off x="9777676" y="2977677"/>
+              <a:ext cx="1468016" cy="1117265"/>
+            </a:xfrm>
+            <a:prstGeom prst="diamond">
+              <a:avLst/>
+            </a:prstGeom>
+          </p:spPr>
+          <p:style>
+            <a:lnRef idx="2">
+              <a:schemeClr val="accent1">
+                <a:shade val="50000"/>
+              </a:schemeClr>
+            </a:lnRef>
+            <a:fillRef idx="1">
+              <a:schemeClr val="accent1"/>
+            </a:fillRef>
+            <a:effectRef idx="0">
+              <a:schemeClr val="accent1"/>
+            </a:effectRef>
+            <a:fontRef idx="minor">
+              <a:schemeClr val="lt1"/>
+            </a:fontRef>
+          </p:style>
+          <p:txBody>
+            <a:bodyPr rtlCol="0" anchor="ctr"/>
+            <a:lstStyle/>
+            <a:p>
+              <a:pPr algn="ctr"/>
+              <a:r>
+                <a:rPr lang="it-IT" sz="1200" dirty="0" err="1"/>
+                <a:t>is</a:t>
+              </a:r>
+              <a:r>
+                <a:rPr lang="it-IT" sz="1200" dirty="0"/>
+                <a:t> DATA?</a:t>
+              </a:r>
+              <a:endParaRPr lang="en-GB" sz="1200" dirty="0"/>
+            </a:p>
+          </p:txBody>
+        </p:sp>
+        <p:cxnSp>
+          <p:nvCxnSpPr>
+            <p:cNvPr id="57" name="Connettore 2 56">
+              <a:extLst>
+                <a:ext uri="{FF2B5EF4-FFF2-40B4-BE49-F238E27FC236}">
+                  <a16:creationId xmlns:a16="http://schemas.microsoft.com/office/drawing/2014/main" id="{45834212-D3AD-4D97-90B8-24FF8277E60E}"/>
+                </a:ext>
+              </a:extLst>
+            </p:cNvPr>
+            <p:cNvCxnSpPr>
+              <a:stCxn id="52" idx="3"/>
+              <a:endCxn id="53" idx="1"/>
+            </p:cNvCxnSpPr>
+            <p:nvPr/>
+          </p:nvCxnSpPr>
+          <p:spPr>
+            <a:xfrm>
+              <a:off x="6973883" y="3536310"/>
+              <a:ext cx="683332" cy="0"/>
+            </a:xfrm>
+            <a:prstGeom prst="straightConnector1">
+              <a:avLst/>
+            </a:prstGeom>
+            <a:ln>
+              <a:tailEnd type="triangle"/>
+            </a:ln>
+          </p:spPr>
+          <p:style>
+            <a:lnRef idx="1">
+              <a:schemeClr val="accent1"/>
+            </a:lnRef>
+            <a:fillRef idx="0">
+              <a:schemeClr val="accent1"/>
+            </a:fillRef>
+            <a:effectRef idx="0">
+              <a:schemeClr val="accent1"/>
+            </a:effectRef>
+            <a:fontRef idx="minor">
+              <a:schemeClr val="tx1"/>
+            </a:fontRef>
+          </p:style>
+        </p:cxnSp>
+        <p:cxnSp>
+          <p:nvCxnSpPr>
+            <p:cNvPr id="59" name="Connettore 2 58">
+              <a:extLst>
+                <a:ext uri="{FF2B5EF4-FFF2-40B4-BE49-F238E27FC236}">
+                  <a16:creationId xmlns:a16="http://schemas.microsoft.com/office/drawing/2014/main" id="{C67A6FC9-4E0C-4199-8A9F-3C367C49BB74}"/>
+                </a:ext>
+              </a:extLst>
+            </p:cNvPr>
+            <p:cNvCxnSpPr>
+              <a:stCxn id="53" idx="3"/>
+              <a:endCxn id="55" idx="1"/>
+            </p:cNvCxnSpPr>
+            <p:nvPr/>
+          </p:nvCxnSpPr>
+          <p:spPr>
+            <a:xfrm>
+              <a:off x="9125231" y="3536310"/>
+              <a:ext cx="652445" cy="0"/>
+            </a:xfrm>
+            <a:prstGeom prst="straightConnector1">
+              <a:avLst/>
+            </a:prstGeom>
+            <a:ln>
+              <a:tailEnd type="triangle"/>
+            </a:ln>
+          </p:spPr>
+          <p:style>
+            <a:lnRef idx="1">
+              <a:schemeClr val="accent1"/>
+            </a:lnRef>
+            <a:fillRef idx="0">
+              <a:schemeClr val="accent1"/>
+            </a:fillRef>
+            <a:effectRef idx="0">
+              <a:schemeClr val="accent1"/>
+            </a:effectRef>
+            <a:fontRef idx="minor">
+              <a:schemeClr val="tx1"/>
+            </a:fontRef>
+          </p:style>
+        </p:cxnSp>
+        <p:sp>
+          <p:nvSpPr>
+            <p:cNvPr id="63" name="CasellaDiTesto 62">
+              <a:extLst>
+                <a:ext uri="{FF2B5EF4-FFF2-40B4-BE49-F238E27FC236}">
+                  <a16:creationId xmlns:a16="http://schemas.microsoft.com/office/drawing/2014/main" id="{35A28214-7D07-48D5-8750-F736C7FF4395}"/>
+                </a:ext>
+              </a:extLst>
+            </p:cNvPr>
+            <p:cNvSpPr txBox="1"/>
+            <p:nvPr/>
+          </p:nvSpPr>
+          <p:spPr>
+            <a:xfrm>
+              <a:off x="9189669" y="3244334"/>
+              <a:ext cx="486030" cy="369332"/>
+            </a:xfrm>
+            <a:prstGeom prst="rect">
+              <a:avLst/>
+            </a:prstGeom>
+            <a:noFill/>
+          </p:spPr>
+          <p:txBody>
+            <a:bodyPr wrap="none" rtlCol="0">
+              <a:spAutoFit/>
+            </a:bodyPr>
+            <a:lstStyle/>
+            <a:p>
+              <a:r>
+                <a:rPr lang="it-IT" dirty="0"/>
+                <a:t>NO</a:t>
+              </a:r>
+              <a:endParaRPr lang="en-GB" dirty="0"/>
+            </a:p>
+          </p:txBody>
+        </p:sp>
+        <p:sp>
+          <p:nvSpPr>
+            <p:cNvPr id="64" name="Rettangolo 63">
+              <a:extLst>
+                <a:ext uri="{FF2B5EF4-FFF2-40B4-BE49-F238E27FC236}">
+                  <a16:creationId xmlns:a16="http://schemas.microsoft.com/office/drawing/2014/main" id="{65133D29-0B4B-4A25-8B73-2D7571FC0871}"/>
+                </a:ext>
+              </a:extLst>
+            </p:cNvPr>
+            <p:cNvSpPr/>
+            <p:nvPr/>
+          </p:nvSpPr>
+          <p:spPr>
+            <a:xfrm>
+              <a:off x="7595761" y="4888256"/>
+              <a:ext cx="1593908" cy="713064"/>
+            </a:xfrm>
+            <a:prstGeom prst="rect">
+              <a:avLst/>
+            </a:prstGeom>
+          </p:spPr>
+          <p:style>
+            <a:lnRef idx="2">
+              <a:schemeClr val="accent1">
+                <a:shade val="50000"/>
+              </a:schemeClr>
+            </a:lnRef>
+            <a:fillRef idx="1">
+              <a:schemeClr val="accent1"/>
+            </a:fillRef>
+            <a:effectRef idx="0">
+              <a:schemeClr val="accent1"/>
+            </a:effectRef>
+            <a:fontRef idx="minor">
+              <a:schemeClr val="lt1"/>
+            </a:fontRef>
+          </p:style>
+          <p:txBody>
+            <a:bodyPr rtlCol="0" anchor="ctr"/>
+            <a:lstStyle/>
+            <a:p>
+              <a:pPr algn="ctr"/>
+              <a:r>
+                <a:rPr lang="it-IT" dirty="0"/>
+                <a:t>UPDATE CONF</a:t>
+              </a:r>
+              <a:endParaRPr lang="en-GB" dirty="0"/>
+            </a:p>
+          </p:txBody>
+        </p:sp>
+        <p:sp>
+          <p:nvSpPr>
+            <p:cNvPr id="65" name="Rettangolo 64">
+              <a:extLst>
+                <a:ext uri="{FF2B5EF4-FFF2-40B4-BE49-F238E27FC236}">
+                  <a16:creationId xmlns:a16="http://schemas.microsoft.com/office/drawing/2014/main" id="{662ED2C9-5356-4A59-924A-932B43D4AFE7}"/>
+                </a:ext>
+              </a:extLst>
+            </p:cNvPr>
+            <p:cNvSpPr/>
+            <p:nvPr/>
+          </p:nvSpPr>
+          <p:spPr>
+            <a:xfrm>
+              <a:off x="9714730" y="4888256"/>
+              <a:ext cx="1593908" cy="713064"/>
+            </a:xfrm>
+            <a:prstGeom prst="rect">
+              <a:avLst/>
+            </a:prstGeom>
+          </p:spPr>
+          <p:style>
+            <a:lnRef idx="2">
+              <a:schemeClr val="accent1">
+                <a:shade val="50000"/>
+              </a:schemeClr>
+            </a:lnRef>
+            <a:fillRef idx="1">
+              <a:schemeClr val="accent1"/>
+            </a:fillRef>
+            <a:effectRef idx="0">
+              <a:schemeClr val="accent1"/>
+            </a:effectRef>
+            <a:fontRef idx="minor">
+              <a:schemeClr val="lt1"/>
+            </a:fontRef>
+          </p:style>
+          <p:txBody>
+            <a:bodyPr rtlCol="0" anchor="ctr"/>
+            <a:lstStyle/>
+            <a:p>
+              <a:pPr algn="ctr"/>
+              <a:r>
+                <a:rPr lang="it-IT" dirty="0" err="1"/>
+                <a:t>Manage</a:t>
+              </a:r>
+              <a:r>
+                <a:rPr lang="it-IT" dirty="0"/>
+                <a:t> Data</a:t>
+              </a:r>
+              <a:endParaRPr lang="en-GB" dirty="0"/>
+            </a:p>
+          </p:txBody>
+        </p:sp>
+        <p:cxnSp>
+          <p:nvCxnSpPr>
+            <p:cNvPr id="67" name="Connettore 2 66">
+              <a:extLst>
+                <a:ext uri="{FF2B5EF4-FFF2-40B4-BE49-F238E27FC236}">
+                  <a16:creationId xmlns:a16="http://schemas.microsoft.com/office/drawing/2014/main" id="{6737B17D-66ED-4AB3-8394-BFE7EEA8940F}"/>
+                </a:ext>
+              </a:extLst>
+            </p:cNvPr>
+            <p:cNvCxnSpPr>
+              <a:stCxn id="51" idx="2"/>
+              <a:endCxn id="52" idx="0"/>
+            </p:cNvCxnSpPr>
+            <p:nvPr/>
+          </p:nvCxnSpPr>
+          <p:spPr>
+            <a:xfrm>
+              <a:off x="6176929" y="2665190"/>
+              <a:ext cx="0" cy="514588"/>
+            </a:xfrm>
+            <a:prstGeom prst="straightConnector1">
+              <a:avLst/>
+            </a:prstGeom>
+            <a:ln>
+              <a:tailEnd type="triangle"/>
+            </a:ln>
+          </p:spPr>
+          <p:style>
+            <a:lnRef idx="1">
+              <a:schemeClr val="accent1"/>
+            </a:lnRef>
+            <a:fillRef idx="0">
+              <a:schemeClr val="accent1"/>
+            </a:fillRef>
+            <a:effectRef idx="0">
+              <a:schemeClr val="accent1"/>
+            </a:effectRef>
+            <a:fontRef idx="minor">
+              <a:schemeClr val="tx1"/>
+            </a:fontRef>
+          </p:style>
+        </p:cxnSp>
+        <p:cxnSp>
+          <p:nvCxnSpPr>
+            <p:cNvPr id="71" name="Connettore 2 70">
+              <a:extLst>
+                <a:ext uri="{FF2B5EF4-FFF2-40B4-BE49-F238E27FC236}">
+                  <a16:creationId xmlns:a16="http://schemas.microsoft.com/office/drawing/2014/main" id="{FA01F60B-3B30-4C6E-82E7-28ED83A72F0E}"/>
+                </a:ext>
+              </a:extLst>
+            </p:cNvPr>
+            <p:cNvCxnSpPr>
+              <a:stCxn id="53" idx="2"/>
+              <a:endCxn id="64" idx="0"/>
+            </p:cNvCxnSpPr>
+            <p:nvPr/>
+          </p:nvCxnSpPr>
+          <p:spPr>
+            <a:xfrm>
+              <a:off x="8391223" y="4094942"/>
+              <a:ext cx="1492" cy="793314"/>
+            </a:xfrm>
+            <a:prstGeom prst="straightConnector1">
+              <a:avLst/>
+            </a:prstGeom>
+            <a:ln>
+              <a:tailEnd type="triangle"/>
+            </a:ln>
+          </p:spPr>
+          <p:style>
+            <a:lnRef idx="1">
+              <a:schemeClr val="accent1"/>
+            </a:lnRef>
+            <a:fillRef idx="0">
+              <a:schemeClr val="accent1"/>
+            </a:fillRef>
+            <a:effectRef idx="0">
+              <a:schemeClr val="accent1"/>
+            </a:effectRef>
+            <a:fontRef idx="minor">
+              <a:schemeClr val="tx1"/>
+            </a:fontRef>
+          </p:style>
+        </p:cxnSp>
+        <p:cxnSp>
+          <p:nvCxnSpPr>
+            <p:cNvPr id="73" name="Connettore 2 72">
+              <a:extLst>
+                <a:ext uri="{FF2B5EF4-FFF2-40B4-BE49-F238E27FC236}">
+                  <a16:creationId xmlns:a16="http://schemas.microsoft.com/office/drawing/2014/main" id="{FA1C185C-6FE2-4B1F-A77D-09A0648BB64C}"/>
+                </a:ext>
+              </a:extLst>
+            </p:cNvPr>
+            <p:cNvCxnSpPr>
+              <a:stCxn id="55" idx="2"/>
+              <a:endCxn id="65" idx="0"/>
+            </p:cNvCxnSpPr>
+            <p:nvPr/>
+          </p:nvCxnSpPr>
+          <p:spPr>
+            <a:xfrm>
+              <a:off x="10511684" y="4094942"/>
+              <a:ext cx="0" cy="793314"/>
+            </a:xfrm>
+            <a:prstGeom prst="straightConnector1">
+              <a:avLst/>
+            </a:prstGeom>
+            <a:ln>
+              <a:tailEnd type="triangle"/>
+            </a:ln>
+          </p:spPr>
+          <p:style>
+            <a:lnRef idx="1">
+              <a:schemeClr val="accent1"/>
+            </a:lnRef>
+            <a:fillRef idx="0">
+              <a:schemeClr val="accent1"/>
+            </a:fillRef>
+            <a:effectRef idx="0">
+              <a:schemeClr val="accent1"/>
+            </a:effectRef>
+            <a:fontRef idx="minor">
+              <a:schemeClr val="tx1"/>
+            </a:fontRef>
+          </p:style>
+        </p:cxnSp>
+        <p:cxnSp>
+          <p:nvCxnSpPr>
+            <p:cNvPr id="75" name="Connettore a gomito 74">
+              <a:extLst>
+                <a:ext uri="{FF2B5EF4-FFF2-40B4-BE49-F238E27FC236}">
+                  <a16:creationId xmlns:a16="http://schemas.microsoft.com/office/drawing/2014/main" id="{C3215FF0-12F5-4CF3-9822-8B6840CAAE2A}"/>
+                </a:ext>
+              </a:extLst>
+            </p:cNvPr>
+            <p:cNvCxnSpPr>
+              <a:stCxn id="64" idx="2"/>
+              <a:endCxn id="51" idx="1"/>
+            </p:cNvCxnSpPr>
+            <p:nvPr/>
+          </p:nvCxnSpPr>
+          <p:spPr>
+            <a:xfrm rot="5400000" flipH="1">
+              <a:off x="5240014" y="2448619"/>
+              <a:ext cx="3292662" cy="3012740"/>
+            </a:xfrm>
+            <a:prstGeom prst="bentConnector4">
+              <a:avLst>
+                <a:gd name="adj1" fmla="val -6943"/>
+                <a:gd name="adj2" fmla="val 107588"/>
+              </a:avLst>
+            </a:prstGeom>
+            <a:ln>
+              <a:tailEnd type="triangle"/>
+            </a:ln>
+          </p:spPr>
+          <p:style>
+            <a:lnRef idx="1">
+              <a:schemeClr val="accent1"/>
+            </a:lnRef>
+            <a:fillRef idx="0">
+              <a:schemeClr val="accent1"/>
+            </a:fillRef>
+            <a:effectRef idx="0">
+              <a:schemeClr val="accent1"/>
+            </a:effectRef>
+            <a:fontRef idx="minor">
+              <a:schemeClr val="tx1"/>
+            </a:fontRef>
+          </p:style>
+        </p:cxnSp>
+        <p:cxnSp>
+          <p:nvCxnSpPr>
+            <p:cNvPr id="77" name="Connettore a gomito 76">
+              <a:extLst>
+                <a:ext uri="{FF2B5EF4-FFF2-40B4-BE49-F238E27FC236}">
+                  <a16:creationId xmlns:a16="http://schemas.microsoft.com/office/drawing/2014/main" id="{206FAC4D-35E7-4E57-9FCD-766C6483252C}"/>
+                </a:ext>
+              </a:extLst>
+            </p:cNvPr>
+            <p:cNvCxnSpPr>
+              <a:stCxn id="65" idx="2"/>
+              <a:endCxn id="51" idx="1"/>
+            </p:cNvCxnSpPr>
+            <p:nvPr/>
+          </p:nvCxnSpPr>
+          <p:spPr>
+            <a:xfrm rot="5400000" flipH="1">
+              <a:off x="6299499" y="1389135"/>
+              <a:ext cx="3292662" cy="5131709"/>
+            </a:xfrm>
+            <a:prstGeom prst="bentConnector4">
+              <a:avLst>
+                <a:gd name="adj1" fmla="val -6943"/>
+                <a:gd name="adj2" fmla="val 104455"/>
+              </a:avLst>
+            </a:prstGeom>
+            <a:ln>
+              <a:tailEnd type="triangle"/>
+            </a:ln>
+          </p:spPr>
+          <p:style>
+            <a:lnRef idx="1">
+              <a:schemeClr val="accent1"/>
+            </a:lnRef>
+            <a:fillRef idx="0">
+              <a:schemeClr val="accent1"/>
+            </a:fillRef>
+            <a:effectRef idx="0">
+              <a:schemeClr val="accent1"/>
+            </a:effectRef>
+            <a:fontRef idx="minor">
+              <a:schemeClr val="tx1"/>
+            </a:fontRef>
+          </p:style>
+        </p:cxnSp>
+        <p:sp>
+          <p:nvSpPr>
+            <p:cNvPr id="78" name="CasellaDiTesto 77">
+              <a:extLst>
+                <a:ext uri="{FF2B5EF4-FFF2-40B4-BE49-F238E27FC236}">
+                  <a16:creationId xmlns:a16="http://schemas.microsoft.com/office/drawing/2014/main" id="{6BA0D6C3-541A-444F-A4AC-3A807FA3EAEF}"/>
+                </a:ext>
+              </a:extLst>
+            </p:cNvPr>
+            <p:cNvSpPr txBox="1"/>
+            <p:nvPr/>
+          </p:nvSpPr>
+          <p:spPr>
+            <a:xfrm>
+              <a:off x="7945830" y="4306933"/>
+              <a:ext cx="348172" cy="369332"/>
+            </a:xfrm>
+            <a:prstGeom prst="rect">
+              <a:avLst/>
+            </a:prstGeom>
+            <a:noFill/>
+          </p:spPr>
+          <p:txBody>
+            <a:bodyPr wrap="none" rtlCol="0">
+              <a:spAutoFit/>
+            </a:bodyPr>
+            <a:lstStyle/>
+            <a:p>
+              <a:r>
+                <a:rPr lang="it-IT" dirty="0"/>
+                <a:t>SI</a:t>
+              </a:r>
+              <a:endParaRPr lang="en-GB" dirty="0"/>
+            </a:p>
+          </p:txBody>
+        </p:sp>
+        <p:sp>
+          <p:nvSpPr>
+            <p:cNvPr id="79" name="CasellaDiTesto 78">
+              <a:extLst>
+                <a:ext uri="{FF2B5EF4-FFF2-40B4-BE49-F238E27FC236}">
+                  <a16:creationId xmlns:a16="http://schemas.microsoft.com/office/drawing/2014/main" id="{6407DC25-EA45-403F-BFA5-B464C1D7AE68}"/>
+                </a:ext>
+              </a:extLst>
+            </p:cNvPr>
+            <p:cNvSpPr txBox="1"/>
+            <p:nvPr/>
+          </p:nvSpPr>
+          <p:spPr>
+            <a:xfrm>
+              <a:off x="10180586" y="4266808"/>
+              <a:ext cx="348172" cy="369332"/>
+            </a:xfrm>
+            <a:prstGeom prst="rect">
+              <a:avLst/>
+            </a:prstGeom>
+            <a:noFill/>
+          </p:spPr>
+          <p:txBody>
+            <a:bodyPr wrap="none" rtlCol="0">
+              <a:spAutoFit/>
+            </a:bodyPr>
+            <a:lstStyle/>
+            <a:p>
+              <a:r>
+                <a:rPr lang="it-IT" dirty="0"/>
+                <a:t>SI</a:t>
+              </a:r>
+              <a:endParaRPr lang="en-GB" dirty="0"/>
+            </a:p>
+          </p:txBody>
+        </p:sp>
+      </p:grpSp>
+      <p:pic>
+        <p:nvPicPr>
+          <p:cNvPr id="81" name="Immagine 80">
+            <a:extLst>
+              <a:ext uri="{FF2B5EF4-FFF2-40B4-BE49-F238E27FC236}">
+                <a16:creationId xmlns:a16="http://schemas.microsoft.com/office/drawing/2014/main" id="{9860220F-97ED-46ED-8D90-793320B4F426}"/>
+              </a:ext>
+            </a:extLst>
+          </p:cNvPr>
+          <p:cNvPicPr>
+            <a:picLocks noChangeAspect="1"/>
+          </p:cNvPicPr>
+          <p:nvPr/>
+        </p:nvPicPr>
+        <p:blipFill>
+          <a:blip r:embed="rId4"/>
+          <a:stretch>
+            <a:fillRect/>
+          </a:stretch>
+        </p:blipFill>
+        <p:spPr>
+          <a:xfrm>
+            <a:off x="7747955" y="592600"/>
+            <a:ext cx="4111239" cy="3582593"/>
+          </a:xfrm>
+          <a:prstGeom prst="rect">
+            <a:avLst/>
+          </a:prstGeom>
+        </p:spPr>
+      </p:pic>
+      <p:grpSp>
+        <p:nvGrpSpPr>
+          <p:cNvPr id="114" name="Gruppo 113">
+            <a:extLst>
+              <a:ext uri="{FF2B5EF4-FFF2-40B4-BE49-F238E27FC236}">
+                <a16:creationId xmlns:a16="http://schemas.microsoft.com/office/drawing/2014/main" id="{2487A16F-A8A3-440D-A4E0-3C3EAAEF305D}"/>
+              </a:ext>
+            </a:extLst>
+          </p:cNvPr>
+          <p:cNvGrpSpPr/>
+          <p:nvPr/>
+        </p:nvGrpSpPr>
+        <p:grpSpPr>
+          <a:xfrm>
+            <a:off x="12988954" y="4718388"/>
+            <a:ext cx="11185053" cy="2362064"/>
+            <a:chOff x="538734" y="4058689"/>
+            <a:chExt cx="11185053" cy="2362064"/>
+          </a:xfrm>
+        </p:grpSpPr>
+        <p:sp>
+          <p:nvSpPr>
+            <p:cNvPr id="82" name="Rettangolo 81">
+              <a:extLst>
+                <a:ext uri="{FF2B5EF4-FFF2-40B4-BE49-F238E27FC236}">
+                  <a16:creationId xmlns:a16="http://schemas.microsoft.com/office/drawing/2014/main" id="{454D2E7C-84DE-462C-98AF-EB69F4FA97C0}"/>
+                </a:ext>
+              </a:extLst>
+            </p:cNvPr>
+            <p:cNvSpPr/>
+            <p:nvPr/>
+          </p:nvSpPr>
+          <p:spPr>
+            <a:xfrm>
+              <a:off x="538734" y="4260790"/>
+              <a:ext cx="1593908" cy="713064"/>
+            </a:xfrm>
+            <a:prstGeom prst="rect">
+              <a:avLst/>
+            </a:prstGeom>
+          </p:spPr>
+          <p:style>
+            <a:lnRef idx="2">
+              <a:schemeClr val="accent1">
+                <a:shade val="50000"/>
+              </a:schemeClr>
+            </a:lnRef>
+            <a:fillRef idx="1">
+              <a:schemeClr val="accent1"/>
+            </a:fillRef>
+            <a:effectRef idx="0">
+              <a:schemeClr val="accent1"/>
+            </a:effectRef>
+            <a:fontRef idx="minor">
+              <a:schemeClr val="lt1"/>
+            </a:fontRef>
+          </p:style>
+          <p:txBody>
+            <a:bodyPr rtlCol="0" anchor="ctr"/>
+            <a:lstStyle/>
+            <a:p>
+              <a:pPr algn="ctr"/>
+              <a:r>
+                <a:rPr lang="it-IT" dirty="0" err="1"/>
+                <a:t>Manage</a:t>
+              </a:r>
+              <a:r>
+                <a:rPr lang="it-IT" dirty="0"/>
+                <a:t> Data</a:t>
+              </a:r>
+              <a:endParaRPr lang="en-GB" dirty="0"/>
+            </a:p>
+          </p:txBody>
+        </p:sp>
+        <p:sp>
+          <p:nvSpPr>
+            <p:cNvPr id="83" name="Rettangolo 82">
+              <a:extLst>
+                <a:ext uri="{FF2B5EF4-FFF2-40B4-BE49-F238E27FC236}">
+                  <a16:creationId xmlns:a16="http://schemas.microsoft.com/office/drawing/2014/main" id="{292C2DB4-A68E-418B-B4F3-913297ADCC04}"/>
+                </a:ext>
+              </a:extLst>
+            </p:cNvPr>
+            <p:cNvSpPr/>
+            <p:nvPr/>
+          </p:nvSpPr>
+          <p:spPr>
+            <a:xfrm>
+              <a:off x="2815974" y="4254431"/>
+              <a:ext cx="1593908" cy="713064"/>
+            </a:xfrm>
+            <a:prstGeom prst="rect">
+              <a:avLst/>
+            </a:prstGeom>
+          </p:spPr>
+          <p:style>
+            <a:lnRef idx="2">
+              <a:schemeClr val="accent1">
+                <a:shade val="50000"/>
+              </a:schemeClr>
+            </a:lnRef>
+            <a:fillRef idx="1">
+              <a:schemeClr val="accent1"/>
+            </a:fillRef>
+            <a:effectRef idx="0">
+              <a:schemeClr val="accent1"/>
+            </a:effectRef>
+            <a:fontRef idx="minor">
+              <a:schemeClr val="lt1"/>
+            </a:fontRef>
+          </p:style>
+          <p:txBody>
+            <a:bodyPr rtlCol="0" anchor="ctr"/>
+            <a:lstStyle/>
+            <a:p>
+              <a:pPr algn="ctr"/>
+              <a:r>
+                <a:rPr lang="it-IT" dirty="0" err="1"/>
+                <a:t>Decode</a:t>
+              </a:r>
+              <a:r>
+                <a:rPr lang="it-IT" dirty="0"/>
+                <a:t> Data Message</a:t>
+              </a:r>
+              <a:endParaRPr lang="en-GB" dirty="0"/>
+            </a:p>
+          </p:txBody>
+        </p:sp>
+        <p:sp>
+          <p:nvSpPr>
+            <p:cNvPr id="84" name="Rombo 83">
+              <a:extLst>
+                <a:ext uri="{FF2B5EF4-FFF2-40B4-BE49-F238E27FC236}">
+                  <a16:creationId xmlns:a16="http://schemas.microsoft.com/office/drawing/2014/main" id="{0D9821FC-F710-4337-BEDA-76A632C2FC7F}"/>
+                </a:ext>
+              </a:extLst>
+            </p:cNvPr>
+            <p:cNvSpPr/>
+            <p:nvPr/>
+          </p:nvSpPr>
+          <p:spPr>
+            <a:xfrm>
+              <a:off x="5374677" y="4058689"/>
+              <a:ext cx="1468016" cy="1117265"/>
+            </a:xfrm>
+            <a:prstGeom prst="diamond">
+              <a:avLst/>
+            </a:prstGeom>
+          </p:spPr>
+          <p:style>
+            <a:lnRef idx="2">
+              <a:schemeClr val="accent1">
+                <a:shade val="50000"/>
+              </a:schemeClr>
+            </a:lnRef>
+            <a:fillRef idx="1">
+              <a:schemeClr val="accent1"/>
+            </a:fillRef>
+            <a:effectRef idx="0">
+              <a:schemeClr val="accent1"/>
+            </a:effectRef>
+            <a:fontRef idx="minor">
+              <a:schemeClr val="lt1"/>
+            </a:fontRef>
+          </p:style>
+          <p:txBody>
+            <a:bodyPr rtlCol="0" anchor="ctr"/>
+            <a:lstStyle/>
+            <a:p>
+              <a:pPr algn="ctr"/>
+              <a:r>
+                <a:rPr lang="it-IT" sz="1200" dirty="0" err="1"/>
+                <a:t>ID_dest</a:t>
+              </a:r>
+              <a:r>
+                <a:rPr lang="it-IT" sz="1200" dirty="0"/>
+                <a:t> == </a:t>
+              </a:r>
+              <a:r>
+                <a:rPr lang="it-IT" sz="1200" dirty="0" err="1"/>
+                <a:t>ID_corr</a:t>
+              </a:r>
+              <a:endParaRPr lang="en-GB" sz="1200" dirty="0"/>
+            </a:p>
+          </p:txBody>
+        </p:sp>
+        <p:sp>
+          <p:nvSpPr>
+            <p:cNvPr id="85" name="Rettangolo 84">
+              <a:extLst>
+                <a:ext uri="{FF2B5EF4-FFF2-40B4-BE49-F238E27FC236}">
+                  <a16:creationId xmlns:a16="http://schemas.microsoft.com/office/drawing/2014/main" id="{4C5B1A89-77EA-49A8-A906-B06559721BD7}"/>
+                </a:ext>
+              </a:extLst>
+            </p:cNvPr>
+            <p:cNvSpPr/>
+            <p:nvPr/>
+          </p:nvSpPr>
+          <p:spPr>
+            <a:xfrm>
+              <a:off x="5322053" y="5707689"/>
+              <a:ext cx="1593908" cy="713064"/>
+            </a:xfrm>
+            <a:prstGeom prst="rect">
+              <a:avLst/>
+            </a:prstGeom>
+          </p:spPr>
+          <p:style>
+            <a:lnRef idx="2">
+              <a:schemeClr val="accent1">
+                <a:shade val="50000"/>
+              </a:schemeClr>
+            </a:lnRef>
+            <a:fillRef idx="1">
+              <a:schemeClr val="accent1"/>
+            </a:fillRef>
+            <a:effectRef idx="0">
+              <a:schemeClr val="accent1"/>
+            </a:effectRef>
+            <a:fontRef idx="minor">
+              <a:schemeClr val="lt1"/>
+            </a:fontRef>
+          </p:style>
+          <p:txBody>
+            <a:bodyPr rtlCol="0" anchor="ctr"/>
+            <a:lstStyle/>
+            <a:p>
+              <a:pPr algn="ctr"/>
+              <a:r>
+                <a:rPr lang="it-IT" dirty="0" err="1"/>
+                <a:t>echo_message</a:t>
+              </a:r>
+              <a:endParaRPr lang="en-GB" dirty="0"/>
+            </a:p>
+          </p:txBody>
+        </p:sp>
+        <p:sp>
+          <p:nvSpPr>
+            <p:cNvPr id="86" name="Rombo 85">
+              <a:extLst>
+                <a:ext uri="{FF2B5EF4-FFF2-40B4-BE49-F238E27FC236}">
+                  <a16:creationId xmlns:a16="http://schemas.microsoft.com/office/drawing/2014/main" id="{D2DAF2C6-73A2-4F0F-B5AF-BE54D1EF4DC1}"/>
+                </a:ext>
+              </a:extLst>
+            </p:cNvPr>
+            <p:cNvSpPr/>
+            <p:nvPr/>
+          </p:nvSpPr>
+          <p:spPr>
+            <a:xfrm>
+              <a:off x="7849063" y="4058689"/>
+              <a:ext cx="1468016" cy="1117265"/>
+            </a:xfrm>
+            <a:prstGeom prst="diamond">
+              <a:avLst/>
+            </a:prstGeom>
+          </p:spPr>
+          <p:style>
+            <a:lnRef idx="2">
+              <a:schemeClr val="accent1">
+                <a:shade val="50000"/>
+              </a:schemeClr>
+            </a:lnRef>
+            <a:fillRef idx="1">
+              <a:schemeClr val="accent1"/>
+            </a:fillRef>
+            <a:effectRef idx="0">
+              <a:schemeClr val="accent1"/>
+            </a:effectRef>
+            <a:fontRef idx="minor">
+              <a:schemeClr val="lt1"/>
+            </a:fontRef>
+          </p:style>
+          <p:txBody>
+            <a:bodyPr rtlCol="0" anchor="ctr"/>
+            <a:lstStyle/>
+            <a:p>
+              <a:pPr algn="ctr"/>
+              <a:r>
+                <a:rPr lang="it-IT" sz="1200" dirty="0" err="1"/>
+                <a:t>ID_src</a:t>
+              </a:r>
+              <a:r>
+                <a:rPr lang="it-IT" sz="1200" dirty="0"/>
+                <a:t> == </a:t>
+              </a:r>
+              <a:r>
+                <a:rPr lang="it-IT" sz="1200" dirty="0" err="1"/>
+                <a:t>ID_corr</a:t>
+              </a:r>
+              <a:endParaRPr lang="en-GB" sz="1200" dirty="0"/>
+            </a:p>
+          </p:txBody>
+        </p:sp>
+        <p:sp>
+          <p:nvSpPr>
+            <p:cNvPr id="87" name="Rettangolo 86">
+              <a:extLst>
+                <a:ext uri="{FF2B5EF4-FFF2-40B4-BE49-F238E27FC236}">
+                  <a16:creationId xmlns:a16="http://schemas.microsoft.com/office/drawing/2014/main" id="{43D25546-DFA2-4D73-B172-F3368054CF7E}"/>
+                </a:ext>
+              </a:extLst>
+            </p:cNvPr>
+            <p:cNvSpPr/>
+            <p:nvPr/>
+          </p:nvSpPr>
+          <p:spPr>
+            <a:xfrm>
+              <a:off x="7801511" y="5707689"/>
+              <a:ext cx="1593908" cy="713064"/>
+            </a:xfrm>
+            <a:prstGeom prst="rect">
+              <a:avLst/>
+            </a:prstGeom>
+          </p:spPr>
+          <p:style>
+            <a:lnRef idx="2">
+              <a:schemeClr val="accent1">
+                <a:shade val="50000"/>
+              </a:schemeClr>
+            </a:lnRef>
+            <a:fillRef idx="1">
+              <a:schemeClr val="accent1"/>
+            </a:fillRef>
+            <a:effectRef idx="0">
+              <a:schemeClr val="accent1"/>
+            </a:effectRef>
+            <a:fontRef idx="minor">
+              <a:schemeClr val="lt1"/>
+            </a:fontRef>
+          </p:style>
+          <p:txBody>
+            <a:bodyPr rtlCol="0" anchor="ctr"/>
+            <a:lstStyle/>
+            <a:p>
+              <a:pPr algn="ctr"/>
+              <a:r>
+                <a:rPr lang="it-IT" dirty="0"/>
+                <a:t>Message drop</a:t>
+              </a:r>
+              <a:endParaRPr lang="en-GB" dirty="0"/>
+            </a:p>
+          </p:txBody>
+        </p:sp>
+        <p:sp>
+          <p:nvSpPr>
+            <p:cNvPr id="88" name="Rettangolo 87">
+              <a:extLst>
+                <a:ext uri="{FF2B5EF4-FFF2-40B4-BE49-F238E27FC236}">
+                  <a16:creationId xmlns:a16="http://schemas.microsoft.com/office/drawing/2014/main" id="{F24309E4-7AFF-4A6E-BD45-D54623341B94}"/>
+                </a:ext>
+              </a:extLst>
+            </p:cNvPr>
+            <p:cNvSpPr/>
+            <p:nvPr/>
+          </p:nvSpPr>
+          <p:spPr>
+            <a:xfrm>
+              <a:off x="10129879" y="4274087"/>
+              <a:ext cx="1593908" cy="713064"/>
+            </a:xfrm>
+            <a:prstGeom prst="rect">
+              <a:avLst/>
+            </a:prstGeom>
+          </p:spPr>
+          <p:style>
+            <a:lnRef idx="2">
+              <a:schemeClr val="accent1">
+                <a:shade val="50000"/>
+              </a:schemeClr>
+            </a:lnRef>
+            <a:fillRef idx="1">
+              <a:schemeClr val="accent1"/>
+            </a:fillRef>
+            <a:effectRef idx="0">
+              <a:schemeClr val="accent1"/>
+            </a:effectRef>
+            <a:fontRef idx="minor">
+              <a:schemeClr val="lt1"/>
+            </a:fontRef>
+          </p:style>
+          <p:txBody>
+            <a:bodyPr rtlCol="0" anchor="ctr"/>
+            <a:lstStyle/>
+            <a:p>
+              <a:pPr algn="ctr"/>
+              <a:r>
+                <a:rPr lang="it-IT" dirty="0" err="1"/>
+                <a:t>Send</a:t>
+              </a:r>
+              <a:r>
+                <a:rPr lang="it-IT" dirty="0"/>
+                <a:t> to </a:t>
+              </a:r>
+              <a:r>
+                <a:rPr lang="it-IT" dirty="0" err="1"/>
+                <a:t>nextNode</a:t>
+              </a:r>
+              <a:endParaRPr lang="en-GB" dirty="0"/>
+            </a:p>
+          </p:txBody>
+        </p:sp>
+        <p:cxnSp>
+          <p:nvCxnSpPr>
+            <p:cNvPr id="90" name="Connettore 2 89">
+              <a:extLst>
+                <a:ext uri="{FF2B5EF4-FFF2-40B4-BE49-F238E27FC236}">
+                  <a16:creationId xmlns:a16="http://schemas.microsoft.com/office/drawing/2014/main" id="{5CCC6DC5-B0AF-4359-B676-0EB2A285146D}"/>
+                </a:ext>
+              </a:extLst>
+            </p:cNvPr>
+            <p:cNvCxnSpPr>
+              <a:stCxn id="82" idx="3"/>
+              <a:endCxn id="83" idx="1"/>
+            </p:cNvCxnSpPr>
+            <p:nvPr/>
+          </p:nvCxnSpPr>
+          <p:spPr>
+            <a:xfrm flipV="1">
+              <a:off x="2132642" y="4610963"/>
+              <a:ext cx="683332" cy="6359"/>
+            </a:xfrm>
+            <a:prstGeom prst="straightConnector1">
+              <a:avLst/>
+            </a:prstGeom>
+            <a:ln>
+              <a:tailEnd type="triangle"/>
+            </a:ln>
+          </p:spPr>
+          <p:style>
+            <a:lnRef idx="1">
+              <a:schemeClr val="accent1"/>
+            </a:lnRef>
+            <a:fillRef idx="0">
+              <a:schemeClr val="accent1"/>
+            </a:fillRef>
+            <a:effectRef idx="0">
+              <a:schemeClr val="accent1"/>
+            </a:effectRef>
+            <a:fontRef idx="minor">
+              <a:schemeClr val="tx1"/>
+            </a:fontRef>
+          </p:style>
+        </p:cxnSp>
+        <p:cxnSp>
+          <p:nvCxnSpPr>
+            <p:cNvPr id="93" name="Connettore 2 92">
+              <a:extLst>
+                <a:ext uri="{FF2B5EF4-FFF2-40B4-BE49-F238E27FC236}">
+                  <a16:creationId xmlns:a16="http://schemas.microsoft.com/office/drawing/2014/main" id="{469298FC-DE1D-4E2C-9D43-D247D524A73F}"/>
+                </a:ext>
+              </a:extLst>
+            </p:cNvPr>
+            <p:cNvCxnSpPr>
+              <a:stCxn id="83" idx="3"/>
+              <a:endCxn id="84" idx="1"/>
+            </p:cNvCxnSpPr>
+            <p:nvPr/>
+          </p:nvCxnSpPr>
+          <p:spPr>
+            <a:xfrm>
+              <a:off x="4409882" y="4610963"/>
+              <a:ext cx="964795" cy="6359"/>
+            </a:xfrm>
+            <a:prstGeom prst="straightConnector1">
+              <a:avLst/>
+            </a:prstGeom>
+            <a:ln>
+              <a:tailEnd type="triangle"/>
+            </a:ln>
+          </p:spPr>
+          <p:style>
+            <a:lnRef idx="1">
+              <a:schemeClr val="accent1"/>
+            </a:lnRef>
+            <a:fillRef idx="0">
+              <a:schemeClr val="accent1"/>
+            </a:fillRef>
+            <a:effectRef idx="0">
+              <a:schemeClr val="accent1"/>
+            </a:effectRef>
+            <a:fontRef idx="minor">
+              <a:schemeClr val="tx1"/>
+            </a:fontRef>
+          </p:style>
+        </p:cxnSp>
+        <p:cxnSp>
+          <p:nvCxnSpPr>
+            <p:cNvPr id="96" name="Connettore 2 95">
+              <a:extLst>
+                <a:ext uri="{FF2B5EF4-FFF2-40B4-BE49-F238E27FC236}">
+                  <a16:creationId xmlns:a16="http://schemas.microsoft.com/office/drawing/2014/main" id="{8E1C2004-2DC7-49B2-ADD7-46E684F26473}"/>
+                </a:ext>
+              </a:extLst>
+            </p:cNvPr>
+            <p:cNvCxnSpPr>
+              <a:stCxn id="84" idx="2"/>
+              <a:endCxn id="85" idx="0"/>
+            </p:cNvCxnSpPr>
+            <p:nvPr/>
+          </p:nvCxnSpPr>
+          <p:spPr>
+            <a:xfrm>
+              <a:off x="6108685" y="5175954"/>
+              <a:ext cx="10322" cy="531735"/>
+            </a:xfrm>
+            <a:prstGeom prst="straightConnector1">
+              <a:avLst/>
+            </a:prstGeom>
+            <a:ln>
+              <a:tailEnd type="triangle"/>
+            </a:ln>
+          </p:spPr>
+          <p:style>
+            <a:lnRef idx="1">
+              <a:schemeClr val="accent1"/>
+            </a:lnRef>
+            <a:fillRef idx="0">
+              <a:schemeClr val="accent1"/>
+            </a:fillRef>
+            <a:effectRef idx="0">
+              <a:schemeClr val="accent1"/>
+            </a:effectRef>
+            <a:fontRef idx="minor">
+              <a:schemeClr val="tx1"/>
+            </a:fontRef>
+          </p:style>
+        </p:cxnSp>
+        <p:cxnSp>
+          <p:nvCxnSpPr>
+            <p:cNvPr id="99" name="Connettore 2 98">
+              <a:extLst>
+                <a:ext uri="{FF2B5EF4-FFF2-40B4-BE49-F238E27FC236}">
+                  <a16:creationId xmlns:a16="http://schemas.microsoft.com/office/drawing/2014/main" id="{D04019E6-2B5C-4224-833F-7EB81E553A32}"/>
+                </a:ext>
+              </a:extLst>
+            </p:cNvPr>
+            <p:cNvCxnSpPr>
+              <a:stCxn id="84" idx="3"/>
+              <a:endCxn id="86" idx="1"/>
+            </p:cNvCxnSpPr>
+            <p:nvPr/>
+          </p:nvCxnSpPr>
+          <p:spPr>
+            <a:xfrm>
+              <a:off x="6842693" y="4617322"/>
+              <a:ext cx="1006370" cy="0"/>
+            </a:xfrm>
+            <a:prstGeom prst="straightConnector1">
+              <a:avLst/>
+            </a:prstGeom>
+            <a:ln>
+              <a:tailEnd type="triangle"/>
+            </a:ln>
+          </p:spPr>
+          <p:style>
+            <a:lnRef idx="1">
+              <a:schemeClr val="accent1"/>
+            </a:lnRef>
+            <a:fillRef idx="0">
+              <a:schemeClr val="accent1"/>
+            </a:fillRef>
+            <a:effectRef idx="0">
+              <a:schemeClr val="accent1"/>
+            </a:effectRef>
+            <a:fontRef idx="minor">
+              <a:schemeClr val="tx1"/>
+            </a:fontRef>
+          </p:style>
+        </p:cxnSp>
+        <p:cxnSp>
+          <p:nvCxnSpPr>
+            <p:cNvPr id="102" name="Connettore 2 101">
+              <a:extLst>
+                <a:ext uri="{FF2B5EF4-FFF2-40B4-BE49-F238E27FC236}">
+                  <a16:creationId xmlns:a16="http://schemas.microsoft.com/office/drawing/2014/main" id="{3DBF7F6C-0F47-4E6B-939E-272224CEE75E}"/>
+                </a:ext>
+              </a:extLst>
+            </p:cNvPr>
+            <p:cNvCxnSpPr>
+              <a:cxnSpLocks/>
+              <a:stCxn id="86" idx="2"/>
+              <a:endCxn id="87" idx="0"/>
+            </p:cNvCxnSpPr>
+            <p:nvPr/>
+          </p:nvCxnSpPr>
+          <p:spPr>
+            <a:xfrm>
+              <a:off x="8583071" y="5175954"/>
+              <a:ext cx="15394" cy="531735"/>
+            </a:xfrm>
+            <a:prstGeom prst="straightConnector1">
+              <a:avLst/>
+            </a:prstGeom>
+            <a:ln>
+              <a:tailEnd type="triangle"/>
+            </a:ln>
+          </p:spPr>
+          <p:style>
+            <a:lnRef idx="1">
+              <a:schemeClr val="accent1"/>
+            </a:lnRef>
+            <a:fillRef idx="0">
+              <a:schemeClr val="accent1"/>
+            </a:fillRef>
+            <a:effectRef idx="0">
+              <a:schemeClr val="accent1"/>
+            </a:effectRef>
+            <a:fontRef idx="minor">
+              <a:schemeClr val="tx1"/>
+            </a:fontRef>
+          </p:style>
+        </p:cxnSp>
+        <p:cxnSp>
+          <p:nvCxnSpPr>
+            <p:cNvPr id="106" name="Connettore 2 105">
+              <a:extLst>
+                <a:ext uri="{FF2B5EF4-FFF2-40B4-BE49-F238E27FC236}">
+                  <a16:creationId xmlns:a16="http://schemas.microsoft.com/office/drawing/2014/main" id="{870943E1-B85E-47A0-9DF2-E0086525FCBF}"/>
+                </a:ext>
+              </a:extLst>
+            </p:cNvPr>
+            <p:cNvCxnSpPr>
+              <a:stCxn id="86" idx="3"/>
+              <a:endCxn id="88" idx="1"/>
+            </p:cNvCxnSpPr>
+            <p:nvPr/>
+          </p:nvCxnSpPr>
+          <p:spPr>
+            <a:xfrm>
+              <a:off x="9317079" y="4617322"/>
+              <a:ext cx="812800" cy="13297"/>
+            </a:xfrm>
+            <a:prstGeom prst="straightConnector1">
+              <a:avLst/>
+            </a:prstGeom>
+            <a:ln>
+              <a:tailEnd type="triangle"/>
+            </a:ln>
+          </p:spPr>
+          <p:style>
+            <a:lnRef idx="1">
+              <a:schemeClr val="accent1"/>
+            </a:lnRef>
+            <a:fillRef idx="0">
+              <a:schemeClr val="accent1"/>
+            </a:fillRef>
+            <a:effectRef idx="0">
+              <a:schemeClr val="accent1"/>
+            </a:effectRef>
+            <a:fontRef idx="minor">
+              <a:schemeClr val="tx1"/>
+            </a:fontRef>
+          </p:style>
+        </p:cxnSp>
+        <p:sp>
+          <p:nvSpPr>
+            <p:cNvPr id="109" name="CasellaDiTesto 108">
+              <a:extLst>
+                <a:ext uri="{FF2B5EF4-FFF2-40B4-BE49-F238E27FC236}">
+                  <a16:creationId xmlns:a16="http://schemas.microsoft.com/office/drawing/2014/main" id="{9B40A727-E289-4524-9111-2C0318B6E248}"/>
+                </a:ext>
+              </a:extLst>
+            </p:cNvPr>
+            <p:cNvSpPr txBox="1"/>
+            <p:nvPr/>
+          </p:nvSpPr>
+          <p:spPr>
+            <a:xfrm>
+              <a:off x="6111019" y="5231148"/>
+              <a:ext cx="348172" cy="369332"/>
+            </a:xfrm>
+            <a:prstGeom prst="rect">
+              <a:avLst/>
+            </a:prstGeom>
+            <a:noFill/>
+          </p:spPr>
+          <p:txBody>
+            <a:bodyPr wrap="none" rtlCol="0">
+              <a:spAutoFit/>
+            </a:bodyPr>
+            <a:lstStyle/>
+            <a:p>
+              <a:r>
+                <a:rPr lang="it-IT" dirty="0"/>
+                <a:t>SI</a:t>
+              </a:r>
+              <a:endParaRPr lang="en-GB" dirty="0"/>
+            </a:p>
+          </p:txBody>
+        </p:sp>
+        <p:sp>
+          <p:nvSpPr>
+            <p:cNvPr id="110" name="CasellaDiTesto 109">
+              <a:extLst>
+                <a:ext uri="{FF2B5EF4-FFF2-40B4-BE49-F238E27FC236}">
+                  <a16:creationId xmlns:a16="http://schemas.microsoft.com/office/drawing/2014/main" id="{96C2488C-EBB2-476D-B047-5227F11AFFB1}"/>
+                </a:ext>
+              </a:extLst>
+            </p:cNvPr>
+            <p:cNvSpPr txBox="1"/>
+            <p:nvPr/>
+          </p:nvSpPr>
+          <p:spPr>
+            <a:xfrm>
+              <a:off x="8609129" y="5175954"/>
+              <a:ext cx="348172" cy="369332"/>
+            </a:xfrm>
+            <a:prstGeom prst="rect">
+              <a:avLst/>
+            </a:prstGeom>
+            <a:noFill/>
+          </p:spPr>
+          <p:txBody>
+            <a:bodyPr wrap="none" rtlCol="0">
+              <a:spAutoFit/>
+            </a:bodyPr>
+            <a:lstStyle/>
+            <a:p>
+              <a:r>
+                <a:rPr lang="it-IT" dirty="0"/>
+                <a:t>SI</a:t>
+              </a:r>
+              <a:endParaRPr lang="en-GB" dirty="0"/>
+            </a:p>
+          </p:txBody>
+        </p:sp>
+        <p:sp>
+          <p:nvSpPr>
+            <p:cNvPr id="112" name="CasellaDiTesto 111">
+              <a:extLst>
+                <a:ext uri="{FF2B5EF4-FFF2-40B4-BE49-F238E27FC236}">
+                  <a16:creationId xmlns:a16="http://schemas.microsoft.com/office/drawing/2014/main" id="{9A60BFE0-2FCB-4543-AA19-69557C840A52}"/>
+                </a:ext>
+              </a:extLst>
+            </p:cNvPr>
+            <p:cNvSpPr txBox="1"/>
+            <p:nvPr/>
+          </p:nvSpPr>
+          <p:spPr>
+            <a:xfrm>
+              <a:off x="7080631" y="4284598"/>
+              <a:ext cx="486030" cy="369332"/>
+            </a:xfrm>
+            <a:prstGeom prst="rect">
+              <a:avLst/>
+            </a:prstGeom>
+            <a:noFill/>
+          </p:spPr>
+          <p:txBody>
+            <a:bodyPr wrap="none" rtlCol="0">
+              <a:spAutoFit/>
+            </a:bodyPr>
+            <a:lstStyle/>
+            <a:p>
+              <a:r>
+                <a:rPr lang="it-IT" dirty="0"/>
+                <a:t>NO</a:t>
+              </a:r>
+              <a:endParaRPr lang="en-GB" dirty="0"/>
+            </a:p>
+          </p:txBody>
+        </p:sp>
+        <p:sp>
+          <p:nvSpPr>
+            <p:cNvPr id="113" name="CasellaDiTesto 112">
+              <a:extLst>
+                <a:ext uri="{FF2B5EF4-FFF2-40B4-BE49-F238E27FC236}">
+                  <a16:creationId xmlns:a16="http://schemas.microsoft.com/office/drawing/2014/main" id="{99B59CBF-FFCD-46CD-B589-E1047F6F9381}"/>
+                </a:ext>
+              </a:extLst>
+            </p:cNvPr>
+            <p:cNvSpPr txBox="1"/>
+            <p:nvPr/>
+          </p:nvSpPr>
+          <p:spPr>
+            <a:xfrm>
+              <a:off x="9405911" y="4280155"/>
+              <a:ext cx="486030" cy="369332"/>
+            </a:xfrm>
+            <a:prstGeom prst="rect">
+              <a:avLst/>
+            </a:prstGeom>
+            <a:noFill/>
+          </p:spPr>
+          <p:txBody>
+            <a:bodyPr wrap="none" rtlCol="0">
+              <a:spAutoFit/>
+            </a:bodyPr>
+            <a:lstStyle/>
+            <a:p>
+              <a:r>
+                <a:rPr lang="it-IT" dirty="0"/>
+                <a:t>NO</a:t>
+              </a:r>
+              <a:endParaRPr lang="en-GB" dirty="0"/>
+            </a:p>
+          </p:txBody>
+        </p:sp>
+      </p:grpSp>
+      <p:pic>
+        <p:nvPicPr>
+          <p:cNvPr id="115" name="Immagine 114">
+            <a:extLst>
+              <a:ext uri="{FF2B5EF4-FFF2-40B4-BE49-F238E27FC236}">
+                <a16:creationId xmlns:a16="http://schemas.microsoft.com/office/drawing/2014/main" id="{03F595B8-3FE7-4208-B49D-A4193F2CCF86}"/>
+              </a:ext>
+            </a:extLst>
+          </p:cNvPr>
+          <p:cNvPicPr>
+            <a:picLocks noChangeAspect="1"/>
+          </p:cNvPicPr>
+          <p:nvPr/>
+        </p:nvPicPr>
+        <p:blipFill>
+          <a:blip r:embed="rId5"/>
+          <a:stretch>
+            <a:fillRect/>
+          </a:stretch>
+        </p:blipFill>
+        <p:spPr>
+          <a:xfrm>
+            <a:off x="5344189" y="4617521"/>
+            <a:ext cx="6212817" cy="1318997"/>
+          </a:xfrm>
+          <a:prstGeom prst="rect">
+            <a:avLst/>
+          </a:prstGeom>
+        </p:spPr>
+      </p:pic>
+    </p:spTree>
+    <p:extLst>
+      <p:ext uri="{BB962C8B-B14F-4D97-AF65-F5344CB8AC3E}">
+        <p14:creationId xmlns:p14="http://schemas.microsoft.com/office/powerpoint/2010/main" val="3127350879"/>
+      </p:ext>
+    </p:extLst>
+  </p:cSld>
+  <p:clrMapOvr>
+    <a:masterClrMapping/>
+  </p:clrMapOvr>
+</p:sld>
+</file>
+
+<file path=ppt/slides/slide4.xml><?xml version="1.0" encoding="utf-8"?>
+<p:sld xmlns:a="http://schemas.openxmlformats.org/drawingml/2006/main" xmlns:r="http://schemas.openxmlformats.org/officeDocument/2006/relationships" xmlns:p="http://schemas.openxmlformats.org/presentationml/2006/main">
+  <p:cSld>
+    <p:spTree>
+      <p:nvGrpSpPr>
+        <p:cNvPr id="1" name=""/>
+        <p:cNvGrpSpPr/>
+        <p:nvPr/>
+      </p:nvGrpSpPr>
+      <p:grpSpPr>
+        <a:xfrm>
+          <a:off x="0" y="0"/>
+          <a:ext cx="0" cy="0"/>
+          <a:chOff x="0" y="0"/>
+          <a:chExt cx="0" cy="0"/>
+        </a:xfrm>
+      </p:grpSpPr>
+      <p:pic>
+        <p:nvPicPr>
+          <p:cNvPr id="3" name="Immagine 2">
+            <a:extLst>
+              <a:ext uri="{FF2B5EF4-FFF2-40B4-BE49-F238E27FC236}">
+                <a16:creationId xmlns:a16="http://schemas.microsoft.com/office/drawing/2014/main" id="{FF389245-22DE-426A-BB37-00FEA362F4B8}"/>
+              </a:ext>
+            </a:extLst>
+          </p:cNvPr>
+          <p:cNvPicPr>
+            <a:picLocks noChangeAspect="1"/>
+          </p:cNvPicPr>
+          <p:nvPr/>
+        </p:nvPicPr>
+        <p:blipFill>
+          <a:blip r:embed="rId2"/>
+          <a:stretch>
+            <a:fillRect/>
+          </a:stretch>
+        </p:blipFill>
+        <p:spPr>
+          <a:xfrm>
+            <a:off x="1095462" y="719776"/>
+            <a:ext cx="9269817" cy="1968006"/>
+          </a:xfrm>
+          <a:prstGeom prst="rect">
+            <a:avLst/>
+          </a:prstGeom>
+        </p:spPr>
+      </p:pic>
+    </p:spTree>
+    <p:extLst>
+      <p:ext uri="{BB962C8B-B14F-4D97-AF65-F5344CB8AC3E}">
+        <p14:creationId xmlns:p14="http://schemas.microsoft.com/office/powerpoint/2010/main" val="530047299"/>
+      </p:ext>
+    </p:extLst>
+  </p:cSld>
+  <p:clrMapOvr>
+    <a:masterClrMapping/>
+  </p:clrMapOvr>
+</p:sld>
+</file>
+
 <file path=ppt/theme/theme1.xml><?xml version="1.0" encoding="utf-8"?>
 <a:theme xmlns:a="http://schemas.openxmlformats.org/drawingml/2006/main" name="Tema di Office">
   <a:themeElements>

</xml_diff>